<commit_message>
Adicionado mais um exemplo de bootstrap
</commit_message>
<xml_diff>
--- a/UC2-FrontEnd/PPTs/2.5-Bootstrap.pptx
+++ b/UC2-FrontEnd/PPTs/2.5-Bootstrap.pptx
@@ -11,10 +11,13 @@
     <p:sldId id="260" r:id="rId5"/>
     <p:sldId id="262" r:id="rId6"/>
     <p:sldId id="263" r:id="rId7"/>
-    <p:sldId id="264" r:id="rId8"/>
-    <p:sldId id="261" r:id="rId9"/>
-    <p:sldId id="266" r:id="rId10"/>
-    <p:sldId id="265" r:id="rId11"/>
+    <p:sldId id="267" r:id="rId8"/>
+    <p:sldId id="268" r:id="rId9"/>
+    <p:sldId id="270" r:id="rId10"/>
+    <p:sldId id="264" r:id="rId11"/>
+    <p:sldId id="261" r:id="rId12"/>
+    <p:sldId id="266" r:id="rId13"/>
+    <p:sldId id="265" r:id="rId14"/>
   </p:sldIdLst>
   <p:sldSz cx="12192000" cy="6858000"/>
   <p:notesSz cx="6858000" cy="9144000"/>
@@ -124,7 +127,7 @@
 <file path=ppt/revisionInfo.xml><?xml version="1.0" encoding="utf-8"?>
 <p1510:revInfo xmlns:a="http://schemas.openxmlformats.org/drawingml/2006/main" xmlns:r="http://schemas.openxmlformats.org/officeDocument/2006/relationships" xmlns:p1510="http://schemas.microsoft.com/office/powerpoint/2015/10/main">
   <p1510:revLst>
-    <p1510:client id="{259416F0-5DB1-478E-AB72-20BF20F12871}" v="1" dt="2024-11-21T13:39:11.800"/>
+    <p1510:client id="{259416F0-5DB1-478E-AB72-20BF20F12871}" v="5" dt="2024-11-22T13:02:13.228"/>
   </p1510:revLst>
 </p1510:revInfo>
 </file>
@@ -133,8 +136,8 @@
 <pc:chgInfo xmlns:a="http://schemas.openxmlformats.org/drawingml/2006/main" xmlns:r="http://schemas.openxmlformats.org/officeDocument/2006/relationships" xmlns:ac="http://schemas.microsoft.com/office/drawing/2013/main/command" xmlns:pc="http://schemas.microsoft.com/office/powerpoint/2013/main/command">
   <pc:docChgLst>
     <pc:chgData name="Pablo Garcia" userId="45d086511dae29ac" providerId="LiveId" clId="{259416F0-5DB1-478E-AB72-20BF20F12871}"/>
-    <pc:docChg chg="undo custSel addSld modSld">
-      <pc:chgData name="Pablo Garcia" userId="45d086511dae29ac" providerId="LiveId" clId="{259416F0-5DB1-478E-AB72-20BF20F12871}" dt="2024-11-21T13:39:17.460" v="69" actId="1076"/>
+    <pc:docChg chg="undo custSel addSld delSld modSld sldOrd">
+      <pc:chgData name="Pablo Garcia" userId="45d086511dae29ac" providerId="LiveId" clId="{259416F0-5DB1-478E-AB72-20BF20F12871}" dt="2024-11-22T13:04:35.073" v="344" actId="2696"/>
       <pc:docMkLst>
         <pc:docMk/>
       </pc:docMkLst>
@@ -208,6 +211,186 @@
           </ac:picMkLst>
         </pc:picChg>
       </pc:sldChg>
+      <pc:sldChg chg="addSp delSp modSp add mod">
+        <pc:chgData name="Pablo Garcia" userId="45d086511dae29ac" providerId="LiveId" clId="{259416F0-5DB1-478E-AB72-20BF20F12871}" dt="2024-11-22T12:58:04.246" v="107" actId="208"/>
+        <pc:sldMkLst>
+          <pc:docMk/>
+          <pc:sldMk cId="2175215992" sldId="267"/>
+        </pc:sldMkLst>
+        <pc:spChg chg="del">
+          <ac:chgData name="Pablo Garcia" userId="45d086511dae29ac" providerId="LiveId" clId="{259416F0-5DB1-478E-AB72-20BF20F12871}" dt="2024-11-22T12:53:08.899" v="71" actId="478"/>
+          <ac:spMkLst>
+            <pc:docMk/>
+            <pc:sldMk cId="2175215992" sldId="267"/>
+            <ac:spMk id="4" creationId="{C6DA0BB6-6BB8-2DA7-6813-713BA88AA385}"/>
+          </ac:spMkLst>
+        </pc:spChg>
+        <pc:spChg chg="mod">
+          <ac:chgData name="Pablo Garcia" userId="45d086511dae29ac" providerId="LiveId" clId="{259416F0-5DB1-478E-AB72-20BF20F12871}" dt="2024-11-22T12:57:23.205" v="92" actId="1076"/>
+          <ac:spMkLst>
+            <pc:docMk/>
+            <pc:sldMk cId="2175215992" sldId="267"/>
+            <ac:spMk id="6" creationId="{759200D8-434E-0201-4876-B10277CF17B6}"/>
+          </ac:spMkLst>
+        </pc:spChg>
+        <pc:spChg chg="add mod">
+          <ac:chgData name="Pablo Garcia" userId="45d086511dae29ac" providerId="LiveId" clId="{259416F0-5DB1-478E-AB72-20BF20F12871}" dt="2024-11-22T12:57:38.341" v="104" actId="20577"/>
+          <ac:spMkLst>
+            <pc:docMk/>
+            <pc:sldMk cId="2175215992" sldId="267"/>
+            <ac:spMk id="7" creationId="{C0BA8874-DF09-A1DF-C835-5CBEBD04C43F}"/>
+          </ac:spMkLst>
+        </pc:spChg>
+        <pc:spChg chg="add mod">
+          <ac:chgData name="Pablo Garcia" userId="45d086511dae29ac" providerId="LiveId" clId="{259416F0-5DB1-478E-AB72-20BF20F12871}" dt="2024-11-22T12:58:04.246" v="107" actId="208"/>
+          <ac:spMkLst>
+            <pc:docMk/>
+            <pc:sldMk cId="2175215992" sldId="267"/>
+            <ac:spMk id="8" creationId="{2BA684A6-13CE-44D0-ABE8-55A972B91EEC}"/>
+          </ac:spMkLst>
+        </pc:spChg>
+        <pc:picChg chg="add mod">
+          <ac:chgData name="Pablo Garcia" userId="45d086511dae29ac" providerId="LiveId" clId="{259416F0-5DB1-478E-AB72-20BF20F12871}" dt="2024-11-22T12:56:51.986" v="83" actId="14100"/>
+          <ac:picMkLst>
+            <pc:docMk/>
+            <pc:sldMk cId="2175215992" sldId="267"/>
+            <ac:picMk id="3" creationId="{7666D6BF-3B78-3D2D-ABEF-ABF827B48867}"/>
+          </ac:picMkLst>
+        </pc:picChg>
+        <pc:picChg chg="del">
+          <ac:chgData name="Pablo Garcia" userId="45d086511dae29ac" providerId="LiveId" clId="{259416F0-5DB1-478E-AB72-20BF20F12871}" dt="2024-11-22T12:53:09.634" v="72" actId="478"/>
+          <ac:picMkLst>
+            <pc:docMk/>
+            <pc:sldMk cId="2175215992" sldId="267"/>
+            <ac:picMk id="10" creationId="{E6B38E68-6A59-6722-09D2-920AB16BD015}"/>
+          </ac:picMkLst>
+        </pc:picChg>
+      </pc:sldChg>
+      <pc:sldChg chg="addSp delSp modSp add mod">
+        <pc:chgData name="Pablo Garcia" userId="45d086511dae29ac" providerId="LiveId" clId="{259416F0-5DB1-478E-AB72-20BF20F12871}" dt="2024-11-22T13:00:06.305" v="157" actId="20577"/>
+        <pc:sldMkLst>
+          <pc:docMk/>
+          <pc:sldMk cId="846773731" sldId="268"/>
+        </pc:sldMkLst>
+        <pc:spChg chg="mod">
+          <ac:chgData name="Pablo Garcia" userId="45d086511dae29ac" providerId="LiveId" clId="{259416F0-5DB1-478E-AB72-20BF20F12871}" dt="2024-11-22T13:00:06.305" v="157" actId="20577"/>
+          <ac:spMkLst>
+            <pc:docMk/>
+            <pc:sldMk cId="846773731" sldId="268"/>
+            <ac:spMk id="7" creationId="{FBB72CA1-1943-3488-8B67-AB973FC7BD42}"/>
+          </ac:spMkLst>
+        </pc:spChg>
+        <pc:spChg chg="mod">
+          <ac:chgData name="Pablo Garcia" userId="45d086511dae29ac" providerId="LiveId" clId="{259416F0-5DB1-478E-AB72-20BF20F12871}" dt="2024-11-22T12:59:59.920" v="151" actId="14100"/>
+          <ac:spMkLst>
+            <pc:docMk/>
+            <pc:sldMk cId="846773731" sldId="268"/>
+            <ac:spMk id="8" creationId="{A4D7D513-852A-77A8-8B69-E2A98D5ACB2C}"/>
+          </ac:spMkLst>
+        </pc:spChg>
+        <pc:picChg chg="del">
+          <ac:chgData name="Pablo Garcia" userId="45d086511dae29ac" providerId="LiveId" clId="{259416F0-5DB1-478E-AB72-20BF20F12871}" dt="2024-11-22T12:58:41.276" v="109" actId="478"/>
+          <ac:picMkLst>
+            <pc:docMk/>
+            <pc:sldMk cId="846773731" sldId="268"/>
+            <ac:picMk id="3" creationId="{93A44120-2952-52E6-4F51-C671A4258643}"/>
+          </ac:picMkLst>
+        </pc:picChg>
+        <pc:picChg chg="add mod ord modCrop">
+          <ac:chgData name="Pablo Garcia" userId="45d086511dae29ac" providerId="LiveId" clId="{259416F0-5DB1-478E-AB72-20BF20F12871}" dt="2024-11-22T12:59:47.811" v="139" actId="167"/>
+          <ac:picMkLst>
+            <pc:docMk/>
+            <pc:sldMk cId="846773731" sldId="268"/>
+            <ac:picMk id="4" creationId="{8FF004E1-367E-BB7A-75DE-585536DDB238}"/>
+          </ac:picMkLst>
+        </pc:picChg>
+      </pc:sldChg>
+      <pc:sldChg chg="addSp delSp modSp add del mod ord">
+        <pc:chgData name="Pablo Garcia" userId="45d086511dae29ac" providerId="LiveId" clId="{259416F0-5DB1-478E-AB72-20BF20F12871}" dt="2024-11-22T13:04:35.073" v="344" actId="2696"/>
+        <pc:sldMkLst>
+          <pc:docMk/>
+          <pc:sldMk cId="1604683832" sldId="269"/>
+        </pc:sldMkLst>
+        <pc:spChg chg="add mod">
+          <ac:chgData name="Pablo Garcia" userId="45d086511dae29ac" providerId="LiveId" clId="{259416F0-5DB1-478E-AB72-20BF20F12871}" dt="2024-11-22T13:01:05.159" v="187" actId="14100"/>
+          <ac:spMkLst>
+            <pc:docMk/>
+            <pc:sldMk cId="1604683832" sldId="269"/>
+            <ac:spMk id="2" creationId="{EBB5895A-A5B3-0313-4FF4-6AA1D3571B47}"/>
+          </ac:spMkLst>
+        </pc:spChg>
+        <pc:spChg chg="add del mod">
+          <ac:chgData name="Pablo Garcia" userId="45d086511dae29ac" providerId="LiveId" clId="{259416F0-5DB1-478E-AB72-20BF20F12871}" dt="2024-11-22T13:01:42.251" v="191" actId="478"/>
+          <ac:spMkLst>
+            <pc:docMk/>
+            <pc:sldMk cId="1604683832" sldId="269"/>
+            <ac:spMk id="4" creationId="{65C54218-D7E4-102B-96D7-E9B245DB702F}"/>
+          </ac:spMkLst>
+        </pc:spChg>
+        <pc:spChg chg="mod">
+          <ac:chgData name="Pablo Garcia" userId="45d086511dae29ac" providerId="LiveId" clId="{259416F0-5DB1-478E-AB72-20BF20F12871}" dt="2024-11-22T13:00:28.019" v="179" actId="20577"/>
+          <ac:spMkLst>
+            <pc:docMk/>
+            <pc:sldMk cId="1604683832" sldId="269"/>
+            <ac:spMk id="7" creationId="{0020F906-5E16-11B2-8FD5-FCDED189E372}"/>
+          </ac:spMkLst>
+        </pc:spChg>
+        <pc:spChg chg="mod">
+          <ac:chgData name="Pablo Garcia" userId="45d086511dae29ac" providerId="LiveId" clId="{259416F0-5DB1-478E-AB72-20BF20F12871}" dt="2024-11-22T13:00:51.614" v="185" actId="14100"/>
+          <ac:spMkLst>
+            <pc:docMk/>
+            <pc:sldMk cId="1604683832" sldId="269"/>
+            <ac:spMk id="8" creationId="{1E4C8BBA-4B11-73EC-BC66-DDD484E36C79}"/>
+          </ac:spMkLst>
+        </pc:spChg>
+        <pc:spChg chg="add mod">
+          <ac:chgData name="Pablo Garcia" userId="45d086511dae29ac" providerId="LiveId" clId="{259416F0-5DB1-478E-AB72-20BF20F12871}" dt="2024-11-22T13:02:18.792" v="193" actId="14100"/>
+          <ac:spMkLst>
+            <pc:docMk/>
+            <pc:sldMk cId="1604683832" sldId="269"/>
+            <ac:spMk id="9" creationId="{B72F27FD-022C-5630-94F3-A92485059EC5}"/>
+          </ac:spMkLst>
+        </pc:spChg>
+      </pc:sldChg>
+      <pc:sldChg chg="modSp add mod">
+        <pc:chgData name="Pablo Garcia" userId="45d086511dae29ac" providerId="LiveId" clId="{259416F0-5DB1-478E-AB72-20BF20F12871}" dt="2024-11-22T13:04:04.669" v="343" actId="14100"/>
+        <pc:sldMkLst>
+          <pc:docMk/>
+          <pc:sldMk cId="3091828657" sldId="270"/>
+        </pc:sldMkLst>
+        <pc:spChg chg="mod">
+          <ac:chgData name="Pablo Garcia" userId="45d086511dae29ac" providerId="LiveId" clId="{259416F0-5DB1-478E-AB72-20BF20F12871}" dt="2024-11-22T13:03:47.794" v="298" actId="14100"/>
+          <ac:spMkLst>
+            <pc:docMk/>
+            <pc:sldMk cId="3091828657" sldId="270"/>
+            <ac:spMk id="2" creationId="{689E553E-C42B-11C2-1E02-56A478E6FED3}"/>
+          </ac:spMkLst>
+        </pc:spChg>
+        <pc:spChg chg="mod">
+          <ac:chgData name="Pablo Garcia" userId="45d086511dae29ac" providerId="LiveId" clId="{259416F0-5DB1-478E-AB72-20BF20F12871}" dt="2024-11-22T13:03:37.013" v="249" actId="14100"/>
+          <ac:spMkLst>
+            <pc:docMk/>
+            <pc:sldMk cId="3091828657" sldId="270"/>
+            <ac:spMk id="8" creationId="{FBEECA16-8A84-AFB1-A872-D59B4A366F83}"/>
+          </ac:spMkLst>
+        </pc:spChg>
+        <pc:spChg chg="mod">
+          <ac:chgData name="Pablo Garcia" userId="45d086511dae29ac" providerId="LiveId" clId="{259416F0-5DB1-478E-AB72-20BF20F12871}" dt="2024-11-22T13:04:04.669" v="343" actId="14100"/>
+          <ac:spMkLst>
+            <pc:docMk/>
+            <pc:sldMk cId="3091828657" sldId="270"/>
+            <ac:spMk id="9" creationId="{E7E8C3EB-4838-6681-DAE4-C07A77B3A9E6}"/>
+          </ac:spMkLst>
+        </pc:spChg>
+        <pc:picChg chg="mod modCrop">
+          <ac:chgData name="Pablo Garcia" userId="45d086511dae29ac" providerId="LiveId" clId="{259416F0-5DB1-478E-AB72-20BF20F12871}" dt="2024-11-22T13:03:52.153" v="300" actId="1076"/>
+          <ac:picMkLst>
+            <pc:docMk/>
+            <pc:sldMk cId="3091828657" sldId="270"/>
+            <ac:picMk id="3" creationId="{8BA0E29D-C4F6-6082-4962-EFCCBF7C0794}"/>
+          </ac:picMkLst>
+        </pc:picChg>
+      </pc:sldChg>
     </pc:docChg>
   </pc:docChgLst>
 </pc:chgInfo>
@@ -362,7 +545,7 @@
           <a:p>
             <a:fld id="{2D4588AC-EB11-4DA1-8919-4086F73DC144}" type="datetimeFigureOut">
               <a:rPr lang="pt-BR" smtClean="0"/>
-              <a:t>21/11/2024</a:t>
+              <a:t>22/11/2024</a:t>
             </a:fld>
             <a:endParaRPr lang="pt-BR"/>
           </a:p>
@@ -562,7 +745,7 @@
           <a:p>
             <a:fld id="{2D4588AC-EB11-4DA1-8919-4086F73DC144}" type="datetimeFigureOut">
               <a:rPr lang="pt-BR" smtClean="0"/>
-              <a:t>21/11/2024</a:t>
+              <a:t>22/11/2024</a:t>
             </a:fld>
             <a:endParaRPr lang="pt-BR"/>
           </a:p>
@@ -772,7 +955,7 @@
           <a:p>
             <a:fld id="{2D4588AC-EB11-4DA1-8919-4086F73DC144}" type="datetimeFigureOut">
               <a:rPr lang="pt-BR" smtClean="0"/>
-              <a:t>21/11/2024</a:t>
+              <a:t>22/11/2024</a:t>
             </a:fld>
             <a:endParaRPr lang="pt-BR"/>
           </a:p>
@@ -972,7 +1155,7 @@
           <a:p>
             <a:fld id="{2D4588AC-EB11-4DA1-8919-4086F73DC144}" type="datetimeFigureOut">
               <a:rPr lang="pt-BR" smtClean="0"/>
-              <a:t>21/11/2024</a:t>
+              <a:t>22/11/2024</a:t>
             </a:fld>
             <a:endParaRPr lang="pt-BR"/>
           </a:p>
@@ -1248,7 +1431,7 @@
           <a:p>
             <a:fld id="{2D4588AC-EB11-4DA1-8919-4086F73DC144}" type="datetimeFigureOut">
               <a:rPr lang="pt-BR" smtClean="0"/>
-              <a:t>21/11/2024</a:t>
+              <a:t>22/11/2024</a:t>
             </a:fld>
             <a:endParaRPr lang="pt-BR"/>
           </a:p>
@@ -1516,7 +1699,7 @@
           <a:p>
             <a:fld id="{2D4588AC-EB11-4DA1-8919-4086F73DC144}" type="datetimeFigureOut">
               <a:rPr lang="pt-BR" smtClean="0"/>
-              <a:t>21/11/2024</a:t>
+              <a:t>22/11/2024</a:t>
             </a:fld>
             <a:endParaRPr lang="pt-BR"/>
           </a:p>
@@ -1931,7 +2114,7 @@
           <a:p>
             <a:fld id="{2D4588AC-EB11-4DA1-8919-4086F73DC144}" type="datetimeFigureOut">
               <a:rPr lang="pt-BR" smtClean="0"/>
-              <a:t>21/11/2024</a:t>
+              <a:t>22/11/2024</a:t>
             </a:fld>
             <a:endParaRPr lang="pt-BR"/>
           </a:p>
@@ -2073,7 +2256,7 @@
           <a:p>
             <a:fld id="{2D4588AC-EB11-4DA1-8919-4086F73DC144}" type="datetimeFigureOut">
               <a:rPr lang="pt-BR" smtClean="0"/>
-              <a:t>21/11/2024</a:t>
+              <a:t>22/11/2024</a:t>
             </a:fld>
             <a:endParaRPr lang="pt-BR"/>
           </a:p>
@@ -2186,7 +2369,7 @@
           <a:p>
             <a:fld id="{2D4588AC-EB11-4DA1-8919-4086F73DC144}" type="datetimeFigureOut">
               <a:rPr lang="pt-BR" smtClean="0"/>
-              <a:t>21/11/2024</a:t>
+              <a:t>22/11/2024</a:t>
             </a:fld>
             <a:endParaRPr lang="pt-BR"/>
           </a:p>
@@ -2499,7 +2682,7 @@
           <a:p>
             <a:fld id="{2D4588AC-EB11-4DA1-8919-4086F73DC144}" type="datetimeFigureOut">
               <a:rPr lang="pt-BR" smtClean="0"/>
-              <a:t>21/11/2024</a:t>
+              <a:t>22/11/2024</a:t>
             </a:fld>
             <a:endParaRPr lang="pt-BR"/>
           </a:p>
@@ -2788,7 +2971,7 @@
           <a:p>
             <a:fld id="{2D4588AC-EB11-4DA1-8919-4086F73DC144}" type="datetimeFigureOut">
               <a:rPr lang="pt-BR" smtClean="0"/>
-              <a:t>21/11/2024</a:t>
+              <a:t>22/11/2024</a:t>
             </a:fld>
             <a:endParaRPr lang="pt-BR"/>
           </a:p>
@@ -3031,7 +3214,7 @@
           <a:p>
             <a:fld id="{2D4588AC-EB11-4DA1-8919-4086F73DC144}" type="datetimeFigureOut">
               <a:rPr lang="pt-BR" smtClean="0"/>
-              <a:t>21/11/2024</a:t>
+              <a:t>22/11/2024</a:t>
             </a:fld>
             <a:endParaRPr lang="pt-BR"/>
           </a:p>
@@ -3695,6 +3878,1037 @@
         <p:cNvPr id="1" name="">
           <a:extLst>
             <a:ext uri="{FF2B5EF4-FFF2-40B4-BE49-F238E27FC236}">
+              <a16:creationId xmlns:a16="http://schemas.microsoft.com/office/drawing/2014/main" id="{D3FB5A75-37D8-F93D-8C12-2093DB52B673}"/>
+            </a:ext>
+          </a:extLst>
+        </p:cNvPr>
+        <p:cNvGrpSpPr/>
+        <p:nvPr/>
+      </p:nvGrpSpPr>
+      <p:grpSpPr>
+        <a:xfrm>
+          <a:off x="0" y="0"/>
+          <a:ext cx="0" cy="0"/>
+          <a:chOff x="0" y="0"/>
+          <a:chExt cx="0" cy="0"/>
+        </a:xfrm>
+      </p:grpSpPr>
+      <p:sp>
+        <p:nvSpPr>
+          <p:cNvPr id="4" name="Rectangle: Rounded Corners 3">
+            <a:extLst>
+              <a:ext uri="{FF2B5EF4-FFF2-40B4-BE49-F238E27FC236}">
+                <a16:creationId xmlns:a16="http://schemas.microsoft.com/office/drawing/2014/main" id="{9BE62E20-97B1-BF51-67EA-683A2010A894}"/>
+              </a:ext>
+            </a:extLst>
+          </p:cNvPr>
+          <p:cNvSpPr/>
+          <p:nvPr/>
+        </p:nvSpPr>
+        <p:spPr>
+          <a:xfrm>
+            <a:off x="503889" y="2572966"/>
+            <a:ext cx="3946190" cy="2213042"/>
+          </a:xfrm>
+          <a:prstGeom prst="roundRect">
+            <a:avLst>
+              <a:gd name="adj" fmla="val 5133"/>
+            </a:avLst>
+          </a:prstGeom>
+          <a:solidFill>
+            <a:schemeClr val="tx1">
+              <a:lumMod val="75000"/>
+              <a:lumOff val="25000"/>
+            </a:schemeClr>
+          </a:solidFill>
+          <a:ln>
+            <a:solidFill>
+              <a:srgbClr val="FFFF00"/>
+            </a:solidFill>
+          </a:ln>
+        </p:spPr>
+        <p:style>
+          <a:lnRef idx="2">
+            <a:schemeClr val="accent1">
+              <a:shade val="15000"/>
+            </a:schemeClr>
+          </a:lnRef>
+          <a:fillRef idx="1">
+            <a:schemeClr val="accent1"/>
+          </a:fillRef>
+          <a:effectRef idx="0">
+            <a:schemeClr val="accent1"/>
+          </a:effectRef>
+          <a:fontRef idx="minor">
+            <a:schemeClr val="lt1"/>
+          </a:fontRef>
+        </p:style>
+        <p:txBody>
+          <a:bodyPr rtlCol="0" anchor="t"/>
+          <a:lstStyle/>
+          <a:p>
+            <a:pPr marL="342900" indent="-342900">
+              <a:buFont typeface="Arial" panose="020B0604020202020204" pitchFamily="34" charset="0"/>
+              <a:buChar char="•"/>
+            </a:pPr>
+            <a:r>
+              <a:rPr lang="pt-BR" sz="2400" dirty="0"/>
+              <a:t>Economia de tempo</a:t>
+            </a:r>
+          </a:p>
+          <a:p>
+            <a:pPr marL="342900" indent="-342900">
+              <a:buFont typeface="Arial" panose="020B0604020202020204" pitchFamily="34" charset="0"/>
+              <a:buChar char="•"/>
+            </a:pPr>
+            <a:r>
+              <a:rPr lang="pt-BR" sz="2400" dirty="0"/>
+              <a:t>Consistência</a:t>
+            </a:r>
+          </a:p>
+          <a:p>
+            <a:pPr marL="342900" indent="-342900">
+              <a:buFont typeface="Arial" panose="020B0604020202020204" pitchFamily="34" charset="0"/>
+              <a:buChar char="•"/>
+            </a:pPr>
+            <a:r>
+              <a:rPr lang="pt-BR" sz="2400" dirty="0"/>
+              <a:t>Trabalho em equipe</a:t>
+            </a:r>
+          </a:p>
+          <a:p>
+            <a:pPr marL="342900" indent="-342900">
+              <a:buFont typeface="Arial" panose="020B0604020202020204" pitchFamily="34" charset="0"/>
+              <a:buChar char="•"/>
+            </a:pPr>
+            <a:r>
+              <a:rPr lang="pt-BR" sz="2400" dirty="0"/>
+              <a:t>Sistema de grid</a:t>
+            </a:r>
+          </a:p>
+          <a:p>
+            <a:pPr marL="342900" indent="-342900">
+              <a:buFont typeface="Arial" panose="020B0604020202020204" pitchFamily="34" charset="0"/>
+              <a:buChar char="•"/>
+            </a:pPr>
+            <a:r>
+              <a:rPr lang="pt-BR" sz="2400" dirty="0"/>
+              <a:t>Aplicações responsivas</a:t>
+            </a:r>
+          </a:p>
+        </p:txBody>
+      </p:sp>
+      <p:pic>
+        <p:nvPicPr>
+          <p:cNvPr id="5" name="Picture 4" descr="A blue and orange logo">
+            <a:extLst>
+              <a:ext uri="{FF2B5EF4-FFF2-40B4-BE49-F238E27FC236}">
+                <a16:creationId xmlns:a16="http://schemas.microsoft.com/office/drawing/2014/main" id="{FBFB69AF-BC31-BB13-15DF-9B648D841720}"/>
+              </a:ext>
+            </a:extLst>
+          </p:cNvPr>
+          <p:cNvPicPr>
+            <a:picLocks noChangeAspect="1"/>
+          </p:cNvPicPr>
+          <p:nvPr/>
+        </p:nvPicPr>
+        <p:blipFill>
+          <a:blip r:embed="rId2">
+            <a:extLst>
+              <a:ext uri="{28A0092B-C50C-407E-A947-70E740481C1C}">
+                <a14:useLocalDpi xmlns:a14="http://schemas.microsoft.com/office/drawing/2010/main" val="0"/>
+              </a:ext>
+            </a:extLst>
+          </a:blip>
+          <a:srcRect r="40990"/>
+          <a:stretch/>
+        </p:blipFill>
+        <p:spPr>
+          <a:xfrm>
+            <a:off x="10752304" y="12502"/>
+            <a:ext cx="1429966" cy="986828"/>
+          </a:xfrm>
+          <a:prstGeom prst="rect">
+            <a:avLst/>
+          </a:prstGeom>
+        </p:spPr>
+      </p:pic>
+      <p:sp>
+        <p:nvSpPr>
+          <p:cNvPr id="6" name="Rectangle: Rounded Corners 5">
+            <a:extLst>
+              <a:ext uri="{FF2B5EF4-FFF2-40B4-BE49-F238E27FC236}">
+                <a16:creationId xmlns:a16="http://schemas.microsoft.com/office/drawing/2014/main" id="{38902722-D02B-476F-4D81-2E63BA6F4F7C}"/>
+              </a:ext>
+            </a:extLst>
+          </p:cNvPr>
+          <p:cNvSpPr/>
+          <p:nvPr/>
+        </p:nvSpPr>
+        <p:spPr>
+          <a:xfrm>
+            <a:off x="421529" y="262648"/>
+            <a:ext cx="5674471" cy="865762"/>
+          </a:xfrm>
+          <a:prstGeom prst="roundRect">
+            <a:avLst/>
+          </a:prstGeom>
+          <a:solidFill>
+            <a:schemeClr val="tx1">
+              <a:lumMod val="75000"/>
+              <a:lumOff val="25000"/>
+            </a:schemeClr>
+          </a:solidFill>
+          <a:ln>
+            <a:solidFill>
+              <a:srgbClr val="FFFF00"/>
+            </a:solidFill>
+          </a:ln>
+        </p:spPr>
+        <p:style>
+          <a:lnRef idx="2">
+            <a:schemeClr val="accent1">
+              <a:shade val="15000"/>
+            </a:schemeClr>
+          </a:lnRef>
+          <a:fillRef idx="1">
+            <a:schemeClr val="accent1"/>
+          </a:fillRef>
+          <a:effectRef idx="0">
+            <a:schemeClr val="accent1"/>
+          </a:effectRef>
+          <a:fontRef idx="minor">
+            <a:schemeClr val="lt1"/>
+          </a:fontRef>
+        </p:style>
+        <p:txBody>
+          <a:bodyPr rtlCol="0" anchor="ctr"/>
+          <a:lstStyle/>
+          <a:p>
+            <a:r>
+              <a:rPr lang="pt-BR" sz="3600" dirty="0" err="1"/>
+              <a:t>Bootstrap</a:t>
+            </a:r>
+            <a:r>
+              <a:rPr lang="pt-BR" sz="3600" dirty="0"/>
+              <a:t> – Prós e Contras</a:t>
+            </a:r>
+          </a:p>
+        </p:txBody>
+      </p:sp>
+      <p:sp>
+        <p:nvSpPr>
+          <p:cNvPr id="2" name="Rectangle: Rounded Corners 1">
+            <a:extLst>
+              <a:ext uri="{FF2B5EF4-FFF2-40B4-BE49-F238E27FC236}">
+                <a16:creationId xmlns:a16="http://schemas.microsoft.com/office/drawing/2014/main" id="{6F6A9A4D-1477-540E-42AF-97F175892561}"/>
+              </a:ext>
+            </a:extLst>
+          </p:cNvPr>
+          <p:cNvSpPr/>
+          <p:nvPr/>
+        </p:nvSpPr>
+        <p:spPr>
+          <a:xfrm>
+            <a:off x="1564204" y="1838527"/>
+            <a:ext cx="1669918" cy="530159"/>
+          </a:xfrm>
+          <a:prstGeom prst="roundRect">
+            <a:avLst/>
+          </a:prstGeom>
+          <a:solidFill>
+            <a:schemeClr val="tx1">
+              <a:lumMod val="75000"/>
+              <a:lumOff val="25000"/>
+            </a:schemeClr>
+          </a:solidFill>
+          <a:ln>
+            <a:solidFill>
+              <a:srgbClr val="FFFF00"/>
+            </a:solidFill>
+          </a:ln>
+        </p:spPr>
+        <p:style>
+          <a:lnRef idx="2">
+            <a:schemeClr val="accent1">
+              <a:shade val="15000"/>
+            </a:schemeClr>
+          </a:lnRef>
+          <a:fillRef idx="1">
+            <a:schemeClr val="accent1"/>
+          </a:fillRef>
+          <a:effectRef idx="0">
+            <a:schemeClr val="accent1"/>
+          </a:effectRef>
+          <a:fontRef idx="minor">
+            <a:schemeClr val="lt1"/>
+          </a:fontRef>
+        </p:style>
+        <p:txBody>
+          <a:bodyPr rtlCol="0" anchor="ctr"/>
+          <a:lstStyle/>
+          <a:p>
+            <a:pPr algn="ctr"/>
+            <a:r>
+              <a:rPr lang="pt-BR" sz="3600" dirty="0"/>
+              <a:t>Prós</a:t>
+            </a:r>
+          </a:p>
+        </p:txBody>
+      </p:sp>
+      <p:sp>
+        <p:nvSpPr>
+          <p:cNvPr id="3" name="Rectangle: Rounded Corners 2">
+            <a:extLst>
+              <a:ext uri="{FF2B5EF4-FFF2-40B4-BE49-F238E27FC236}">
+                <a16:creationId xmlns:a16="http://schemas.microsoft.com/office/drawing/2014/main" id="{37836899-443E-04E6-E69D-D611834E0CCE}"/>
+              </a:ext>
+            </a:extLst>
+          </p:cNvPr>
+          <p:cNvSpPr/>
+          <p:nvPr/>
+        </p:nvSpPr>
+        <p:spPr>
+          <a:xfrm>
+            <a:off x="6746453" y="1809347"/>
+            <a:ext cx="3946190" cy="1395919"/>
+          </a:xfrm>
+          <a:prstGeom prst="roundRect">
+            <a:avLst>
+              <a:gd name="adj" fmla="val 5133"/>
+            </a:avLst>
+          </a:prstGeom>
+          <a:solidFill>
+            <a:schemeClr val="tx1">
+              <a:lumMod val="75000"/>
+              <a:lumOff val="25000"/>
+            </a:schemeClr>
+          </a:solidFill>
+          <a:ln>
+            <a:solidFill>
+              <a:srgbClr val="FFFF00"/>
+            </a:solidFill>
+          </a:ln>
+        </p:spPr>
+        <p:style>
+          <a:lnRef idx="2">
+            <a:schemeClr val="accent1">
+              <a:shade val="15000"/>
+            </a:schemeClr>
+          </a:lnRef>
+          <a:fillRef idx="1">
+            <a:schemeClr val="accent1"/>
+          </a:fillRef>
+          <a:effectRef idx="0">
+            <a:schemeClr val="accent1"/>
+          </a:effectRef>
+          <a:fontRef idx="minor">
+            <a:schemeClr val="lt1"/>
+          </a:fontRef>
+        </p:style>
+        <p:txBody>
+          <a:bodyPr rtlCol="0" anchor="t"/>
+          <a:lstStyle/>
+          <a:p>
+            <a:pPr marL="342900" indent="-342900">
+              <a:buFont typeface="Arial" panose="020B0604020202020204" pitchFamily="34" charset="0"/>
+              <a:buChar char="•"/>
+            </a:pPr>
+            <a:r>
+              <a:rPr lang="pt-BR" sz="2400" dirty="0"/>
+              <a:t>Semelhante a outros</a:t>
+            </a:r>
+          </a:p>
+          <a:p>
+            <a:pPr marL="342900" indent="-342900">
+              <a:buFont typeface="Arial" panose="020B0604020202020204" pitchFamily="34" charset="0"/>
+              <a:buChar char="•"/>
+            </a:pPr>
+            <a:r>
+              <a:rPr lang="pt-BR" sz="2400" dirty="0"/>
+              <a:t>Curva de aprendizado</a:t>
+            </a:r>
+          </a:p>
+          <a:p>
+            <a:pPr marL="342900" indent="-342900">
+              <a:buFont typeface="Arial" panose="020B0604020202020204" pitchFamily="34" charset="0"/>
+              <a:buChar char="•"/>
+            </a:pPr>
+            <a:r>
+              <a:rPr lang="pt-BR" sz="2400" dirty="0"/>
+              <a:t>Tempo de carregamento</a:t>
+            </a:r>
+          </a:p>
+        </p:txBody>
+      </p:sp>
+      <p:sp>
+        <p:nvSpPr>
+          <p:cNvPr id="7" name="Rectangle: Rounded Corners 6">
+            <a:extLst>
+              <a:ext uri="{FF2B5EF4-FFF2-40B4-BE49-F238E27FC236}">
+                <a16:creationId xmlns:a16="http://schemas.microsoft.com/office/drawing/2014/main" id="{6DA6B46E-516F-6F6E-C204-A820FEB63C85}"/>
+              </a:ext>
+            </a:extLst>
+          </p:cNvPr>
+          <p:cNvSpPr/>
+          <p:nvPr/>
+        </p:nvSpPr>
+        <p:spPr>
+          <a:xfrm>
+            <a:off x="7538933" y="1074908"/>
+            <a:ext cx="2458508" cy="530159"/>
+          </a:xfrm>
+          <a:prstGeom prst="roundRect">
+            <a:avLst/>
+          </a:prstGeom>
+          <a:solidFill>
+            <a:schemeClr val="tx1">
+              <a:lumMod val="75000"/>
+              <a:lumOff val="25000"/>
+            </a:schemeClr>
+          </a:solidFill>
+          <a:ln>
+            <a:solidFill>
+              <a:srgbClr val="FFFF00"/>
+            </a:solidFill>
+          </a:ln>
+        </p:spPr>
+        <p:style>
+          <a:lnRef idx="2">
+            <a:schemeClr val="accent1">
+              <a:shade val="15000"/>
+            </a:schemeClr>
+          </a:lnRef>
+          <a:fillRef idx="1">
+            <a:schemeClr val="accent1"/>
+          </a:fillRef>
+          <a:effectRef idx="0">
+            <a:schemeClr val="accent1"/>
+          </a:effectRef>
+          <a:fontRef idx="minor">
+            <a:schemeClr val="lt1"/>
+          </a:fontRef>
+        </p:style>
+        <p:txBody>
+          <a:bodyPr rtlCol="0" anchor="ctr"/>
+          <a:lstStyle/>
+          <a:p>
+            <a:pPr algn="ctr"/>
+            <a:r>
+              <a:rPr lang="pt-BR" sz="3600" dirty="0"/>
+              <a:t>Contras</a:t>
+            </a:r>
+          </a:p>
+        </p:txBody>
+      </p:sp>
+      <p:pic>
+        <p:nvPicPr>
+          <p:cNvPr id="9" name="Picture 8">
+            <a:extLst>
+              <a:ext uri="{FF2B5EF4-FFF2-40B4-BE49-F238E27FC236}">
+                <a16:creationId xmlns:a16="http://schemas.microsoft.com/office/drawing/2014/main" id="{C1679A7E-1551-6641-F523-16158C760B89}"/>
+              </a:ext>
+            </a:extLst>
+          </p:cNvPr>
+          <p:cNvPicPr>
+            <a:picLocks noChangeAspect="1"/>
+          </p:cNvPicPr>
+          <p:nvPr/>
+        </p:nvPicPr>
+        <p:blipFill>
+          <a:blip r:embed="rId3"/>
+          <a:stretch>
+            <a:fillRect/>
+          </a:stretch>
+        </p:blipFill>
+        <p:spPr>
+          <a:xfrm>
+            <a:off x="4717915" y="3409546"/>
+            <a:ext cx="6101188" cy="3157296"/>
+          </a:xfrm>
+          <a:prstGeom prst="rect">
+            <a:avLst/>
+          </a:prstGeom>
+        </p:spPr>
+      </p:pic>
+    </p:spTree>
+    <p:extLst>
+      <p:ext uri="{BB962C8B-B14F-4D97-AF65-F5344CB8AC3E}">
+        <p14:creationId xmlns:p14="http://schemas.microsoft.com/office/powerpoint/2010/main" val="4003374904"/>
+      </p:ext>
+    </p:extLst>
+  </p:cSld>
+  <p:clrMapOvr>
+    <a:masterClrMapping/>
+  </p:clrMapOvr>
+  <mc:AlternateContent xmlns:mc="http://schemas.openxmlformats.org/markup-compatibility/2006" xmlns:p159="http://schemas.microsoft.com/office/powerpoint/2015/09/main">
+    <mc:Choice Requires="p159">
+      <p:transition xmlns:p14="http://schemas.microsoft.com/office/powerpoint/2010/main" spd="slow" p14:dur="2000">
+        <p159:morph option="byObject"/>
+      </p:transition>
+    </mc:Choice>
+    <mc:Fallback xmlns="">
+      <p:transition spd="slow">
+        <p:fade/>
+      </p:transition>
+    </mc:Fallback>
+  </mc:AlternateContent>
+</p:sld>
+</file>
+
+<file path=ppt/slides/slide11.xml><?xml version="1.0" encoding="utf-8"?>
+<p:sld xmlns:a="http://schemas.openxmlformats.org/drawingml/2006/main" xmlns:r="http://schemas.openxmlformats.org/officeDocument/2006/relationships" xmlns:p="http://schemas.openxmlformats.org/presentationml/2006/main">
+  <p:cSld>
+    <p:bg>
+      <p:bgPr>
+        <a:gradFill flip="none" rotWithShape="1">
+          <a:gsLst>
+            <a:gs pos="0">
+              <a:schemeClr val="accent5">
+                <a:lumMod val="5000"/>
+                <a:lumOff val="95000"/>
+              </a:schemeClr>
+            </a:gs>
+            <a:gs pos="100000">
+              <a:schemeClr val="tx1"/>
+            </a:gs>
+          </a:gsLst>
+          <a:lin ang="5400000" scaled="0"/>
+          <a:tileRect/>
+        </a:gradFill>
+        <a:effectLst/>
+      </p:bgPr>
+    </p:bg>
+    <p:spTree>
+      <p:nvGrpSpPr>
+        <p:cNvPr id="1" name="">
+          <a:extLst>
+            <a:ext uri="{FF2B5EF4-FFF2-40B4-BE49-F238E27FC236}">
+              <a16:creationId xmlns:a16="http://schemas.microsoft.com/office/drawing/2014/main" id="{A620F44C-2DEF-A051-E8B6-D3D2B47D6812}"/>
+            </a:ext>
+          </a:extLst>
+        </p:cNvPr>
+        <p:cNvGrpSpPr/>
+        <p:nvPr/>
+      </p:nvGrpSpPr>
+      <p:grpSpPr>
+        <a:xfrm>
+          <a:off x="0" y="0"/>
+          <a:ext cx="0" cy="0"/>
+          <a:chOff x="0" y="0"/>
+          <a:chExt cx="0" cy="0"/>
+        </a:xfrm>
+      </p:grpSpPr>
+      <p:pic>
+        <p:nvPicPr>
+          <p:cNvPr id="5" name="Picture 4" descr="A blue and orange logo">
+            <a:extLst>
+              <a:ext uri="{FF2B5EF4-FFF2-40B4-BE49-F238E27FC236}">
+                <a16:creationId xmlns:a16="http://schemas.microsoft.com/office/drawing/2014/main" id="{63516F30-74F7-466A-AF64-5C9607A85E3A}"/>
+              </a:ext>
+            </a:extLst>
+          </p:cNvPr>
+          <p:cNvPicPr>
+            <a:picLocks noChangeAspect="1"/>
+          </p:cNvPicPr>
+          <p:nvPr/>
+        </p:nvPicPr>
+        <p:blipFill>
+          <a:blip r:embed="rId2">
+            <a:extLst>
+              <a:ext uri="{28A0092B-C50C-407E-A947-70E740481C1C}">
+                <a14:useLocalDpi xmlns:a14="http://schemas.microsoft.com/office/drawing/2010/main" val="0"/>
+              </a:ext>
+            </a:extLst>
+          </a:blip>
+          <a:srcRect r="40990"/>
+          <a:stretch/>
+        </p:blipFill>
+        <p:spPr>
+          <a:xfrm>
+            <a:off x="10752304" y="12502"/>
+            <a:ext cx="1429966" cy="986828"/>
+          </a:xfrm>
+          <a:prstGeom prst="rect">
+            <a:avLst/>
+          </a:prstGeom>
+        </p:spPr>
+      </p:pic>
+      <p:sp>
+        <p:nvSpPr>
+          <p:cNvPr id="6" name="Rectangle: Rounded Corners 5">
+            <a:extLst>
+              <a:ext uri="{FF2B5EF4-FFF2-40B4-BE49-F238E27FC236}">
+                <a16:creationId xmlns:a16="http://schemas.microsoft.com/office/drawing/2014/main" id="{E41CF007-B2E2-DE4B-6DB8-5DF9C5D41EE4}"/>
+              </a:ext>
+            </a:extLst>
+          </p:cNvPr>
+          <p:cNvSpPr/>
+          <p:nvPr/>
+        </p:nvSpPr>
+        <p:spPr>
+          <a:xfrm>
+            <a:off x="421529" y="262648"/>
+            <a:ext cx="2565511" cy="865762"/>
+          </a:xfrm>
+          <a:prstGeom prst="roundRect">
+            <a:avLst/>
+          </a:prstGeom>
+          <a:solidFill>
+            <a:schemeClr val="tx1">
+              <a:lumMod val="75000"/>
+              <a:lumOff val="25000"/>
+            </a:schemeClr>
+          </a:solidFill>
+          <a:ln>
+            <a:solidFill>
+              <a:srgbClr val="FFFF00"/>
+            </a:solidFill>
+          </a:ln>
+        </p:spPr>
+        <p:style>
+          <a:lnRef idx="2">
+            <a:schemeClr val="accent1">
+              <a:shade val="15000"/>
+            </a:schemeClr>
+          </a:lnRef>
+          <a:fillRef idx="1">
+            <a:schemeClr val="accent1"/>
+          </a:fillRef>
+          <a:effectRef idx="0">
+            <a:schemeClr val="accent1"/>
+          </a:effectRef>
+          <a:fontRef idx="minor">
+            <a:schemeClr val="lt1"/>
+          </a:fontRef>
+        </p:style>
+        <p:txBody>
+          <a:bodyPr rtlCol="0" anchor="ctr"/>
+          <a:lstStyle/>
+          <a:p>
+            <a:r>
+              <a:rPr lang="pt-BR" sz="3600" dirty="0" err="1"/>
+              <a:t>Bootstrap</a:t>
+            </a:r>
+            <a:endParaRPr lang="pt-BR" sz="3600" dirty="0"/>
+          </a:p>
+        </p:txBody>
+      </p:sp>
+      <p:pic>
+        <p:nvPicPr>
+          <p:cNvPr id="3" name="Picture 2">
+            <a:hlinkClick r:id="rId3"/>
+            <a:extLst>
+              <a:ext uri="{FF2B5EF4-FFF2-40B4-BE49-F238E27FC236}">
+                <a16:creationId xmlns:a16="http://schemas.microsoft.com/office/drawing/2014/main" id="{58652111-22C2-E03D-1E99-E69A99F46F2C}"/>
+              </a:ext>
+            </a:extLst>
+          </p:cNvPr>
+          <p:cNvPicPr>
+            <a:picLocks noChangeAspect="1"/>
+          </p:cNvPicPr>
+          <p:nvPr/>
+        </p:nvPicPr>
+        <p:blipFill>
+          <a:blip r:embed="rId4"/>
+          <a:stretch>
+            <a:fillRect/>
+          </a:stretch>
+        </p:blipFill>
+        <p:spPr>
+          <a:xfrm>
+            <a:off x="1882303" y="1338895"/>
+            <a:ext cx="8427393" cy="4531753"/>
+          </a:xfrm>
+          <a:prstGeom prst="rect">
+            <a:avLst/>
+          </a:prstGeom>
+        </p:spPr>
+      </p:pic>
+      <p:sp>
+        <p:nvSpPr>
+          <p:cNvPr id="7" name="Rectangle: Rounded Corners 6">
+            <a:extLst>
+              <a:ext uri="{FF2B5EF4-FFF2-40B4-BE49-F238E27FC236}">
+                <a16:creationId xmlns:a16="http://schemas.microsoft.com/office/drawing/2014/main" id="{EF94303F-B490-93BB-34E8-B613B9EA9FC8}"/>
+              </a:ext>
+            </a:extLst>
+          </p:cNvPr>
+          <p:cNvSpPr/>
+          <p:nvPr/>
+        </p:nvSpPr>
+        <p:spPr>
+          <a:xfrm>
+            <a:off x="4075890" y="341378"/>
+            <a:ext cx="6063570" cy="643366"/>
+          </a:xfrm>
+          <a:prstGeom prst="roundRect">
+            <a:avLst/>
+          </a:prstGeom>
+          <a:solidFill>
+            <a:schemeClr val="tx1">
+              <a:lumMod val="75000"/>
+              <a:lumOff val="25000"/>
+            </a:schemeClr>
+          </a:solidFill>
+          <a:ln>
+            <a:solidFill>
+              <a:srgbClr val="FFFF00"/>
+            </a:solidFill>
+          </a:ln>
+        </p:spPr>
+        <p:style>
+          <a:lnRef idx="2">
+            <a:schemeClr val="accent1">
+              <a:shade val="15000"/>
+            </a:schemeClr>
+          </a:lnRef>
+          <a:fillRef idx="1">
+            <a:schemeClr val="accent1"/>
+          </a:fillRef>
+          <a:effectRef idx="0">
+            <a:schemeClr val="accent1"/>
+          </a:effectRef>
+          <a:fontRef idx="minor">
+            <a:schemeClr val="lt1"/>
+          </a:fontRef>
+        </p:style>
+        <p:txBody>
+          <a:bodyPr rtlCol="0" anchor="ctr"/>
+          <a:lstStyle/>
+          <a:p>
+            <a:pPr algn="ctr"/>
+            <a:r>
+              <a:rPr lang="en-US" sz="2400" dirty="0">
+                <a:hlinkClick r:id="rId5"/>
+              </a:rPr>
+              <a:t>Get started with Bootstrap · Bootstrap v5.3</a:t>
+            </a:r>
+            <a:endParaRPr lang="pt-BR" sz="2400" dirty="0"/>
+          </a:p>
+        </p:txBody>
+      </p:sp>
+    </p:spTree>
+    <p:extLst>
+      <p:ext uri="{BB962C8B-B14F-4D97-AF65-F5344CB8AC3E}">
+        <p14:creationId xmlns:p14="http://schemas.microsoft.com/office/powerpoint/2010/main" val="441519137"/>
+      </p:ext>
+    </p:extLst>
+  </p:cSld>
+  <p:clrMapOvr>
+    <a:masterClrMapping/>
+  </p:clrMapOvr>
+  <mc:AlternateContent xmlns:mc="http://schemas.openxmlformats.org/markup-compatibility/2006" xmlns:p159="http://schemas.microsoft.com/office/powerpoint/2015/09/main">
+    <mc:Choice Requires="p159">
+      <p:transition xmlns:p14="http://schemas.microsoft.com/office/powerpoint/2010/main" spd="slow" p14:dur="2000">
+        <p159:morph option="byObject"/>
+      </p:transition>
+    </mc:Choice>
+    <mc:Fallback xmlns="">
+      <p:transition spd="slow">
+        <p:fade/>
+      </p:transition>
+    </mc:Fallback>
+  </mc:AlternateContent>
+</p:sld>
+</file>
+
+<file path=ppt/slides/slide12.xml><?xml version="1.0" encoding="utf-8"?>
+<p:sld xmlns:a="http://schemas.openxmlformats.org/drawingml/2006/main" xmlns:r="http://schemas.openxmlformats.org/officeDocument/2006/relationships" xmlns:p="http://schemas.openxmlformats.org/presentationml/2006/main">
+  <p:cSld>
+    <p:bg>
+      <p:bgPr>
+        <a:gradFill flip="none" rotWithShape="1">
+          <a:gsLst>
+            <a:gs pos="0">
+              <a:schemeClr val="accent5">
+                <a:lumMod val="5000"/>
+                <a:lumOff val="95000"/>
+              </a:schemeClr>
+            </a:gs>
+            <a:gs pos="100000">
+              <a:schemeClr val="tx1"/>
+            </a:gs>
+          </a:gsLst>
+          <a:lin ang="5400000" scaled="0"/>
+          <a:tileRect/>
+        </a:gradFill>
+        <a:effectLst/>
+      </p:bgPr>
+    </p:bg>
+    <p:spTree>
+      <p:nvGrpSpPr>
+        <p:cNvPr id="1" name="">
+          <a:extLst>
+            <a:ext uri="{FF2B5EF4-FFF2-40B4-BE49-F238E27FC236}">
+              <a16:creationId xmlns:a16="http://schemas.microsoft.com/office/drawing/2014/main" id="{206D9CAD-AB07-6A65-3777-44836CEFCD7A}"/>
+            </a:ext>
+          </a:extLst>
+        </p:cNvPr>
+        <p:cNvGrpSpPr/>
+        <p:nvPr/>
+      </p:nvGrpSpPr>
+      <p:grpSpPr>
+        <a:xfrm>
+          <a:off x="0" y="0"/>
+          <a:ext cx="0" cy="0"/>
+          <a:chOff x="0" y="0"/>
+          <a:chExt cx="0" cy="0"/>
+        </a:xfrm>
+      </p:grpSpPr>
+      <p:pic>
+        <p:nvPicPr>
+          <p:cNvPr id="5" name="Picture 4" descr="A blue and orange logo">
+            <a:extLst>
+              <a:ext uri="{FF2B5EF4-FFF2-40B4-BE49-F238E27FC236}">
+                <a16:creationId xmlns:a16="http://schemas.microsoft.com/office/drawing/2014/main" id="{E5745440-D04C-BBC9-3B6B-48EE590BFF9C}"/>
+              </a:ext>
+            </a:extLst>
+          </p:cNvPr>
+          <p:cNvPicPr>
+            <a:picLocks noChangeAspect="1"/>
+          </p:cNvPicPr>
+          <p:nvPr/>
+        </p:nvPicPr>
+        <p:blipFill>
+          <a:blip r:embed="rId2">
+            <a:extLst>
+              <a:ext uri="{28A0092B-C50C-407E-A947-70E740481C1C}">
+                <a14:useLocalDpi xmlns:a14="http://schemas.microsoft.com/office/drawing/2010/main" val="0"/>
+              </a:ext>
+            </a:extLst>
+          </a:blip>
+          <a:srcRect r="40990"/>
+          <a:stretch/>
+        </p:blipFill>
+        <p:spPr>
+          <a:xfrm>
+            <a:off x="10752304" y="12502"/>
+            <a:ext cx="1429966" cy="986828"/>
+          </a:xfrm>
+          <a:prstGeom prst="rect">
+            <a:avLst/>
+          </a:prstGeom>
+        </p:spPr>
+      </p:pic>
+      <p:sp>
+        <p:nvSpPr>
+          <p:cNvPr id="6" name="Rectangle: Rounded Corners 5">
+            <a:extLst>
+              <a:ext uri="{FF2B5EF4-FFF2-40B4-BE49-F238E27FC236}">
+                <a16:creationId xmlns:a16="http://schemas.microsoft.com/office/drawing/2014/main" id="{39C52DA1-CE5E-AD4D-43FC-519F0FC0BF02}"/>
+              </a:ext>
+            </a:extLst>
+          </p:cNvPr>
+          <p:cNvSpPr/>
+          <p:nvPr/>
+        </p:nvSpPr>
+        <p:spPr>
+          <a:xfrm>
+            <a:off x="421529" y="262648"/>
+            <a:ext cx="2565511" cy="865762"/>
+          </a:xfrm>
+          <a:prstGeom prst="roundRect">
+            <a:avLst/>
+          </a:prstGeom>
+          <a:solidFill>
+            <a:schemeClr val="tx1">
+              <a:lumMod val="75000"/>
+              <a:lumOff val="25000"/>
+            </a:schemeClr>
+          </a:solidFill>
+          <a:ln>
+            <a:solidFill>
+              <a:srgbClr val="FFFF00"/>
+            </a:solidFill>
+          </a:ln>
+        </p:spPr>
+        <p:style>
+          <a:lnRef idx="2">
+            <a:schemeClr val="accent1">
+              <a:shade val="15000"/>
+            </a:schemeClr>
+          </a:lnRef>
+          <a:fillRef idx="1">
+            <a:schemeClr val="accent1"/>
+          </a:fillRef>
+          <a:effectRef idx="0">
+            <a:schemeClr val="accent1"/>
+          </a:effectRef>
+          <a:fontRef idx="minor">
+            <a:schemeClr val="lt1"/>
+          </a:fontRef>
+        </p:style>
+        <p:txBody>
+          <a:bodyPr rtlCol="0" anchor="ctr"/>
+          <a:lstStyle/>
+          <a:p>
+            <a:r>
+              <a:rPr lang="pt-BR" sz="3600" dirty="0" err="1"/>
+              <a:t>Bootstrap</a:t>
+            </a:r>
+            <a:endParaRPr lang="pt-BR" sz="3600" dirty="0"/>
+          </a:p>
+        </p:txBody>
+      </p:sp>
+      <p:sp>
+        <p:nvSpPr>
+          <p:cNvPr id="7" name="Rectangle: Rounded Corners 6">
+            <a:extLst>
+              <a:ext uri="{FF2B5EF4-FFF2-40B4-BE49-F238E27FC236}">
+                <a16:creationId xmlns:a16="http://schemas.microsoft.com/office/drawing/2014/main" id="{4A3CE760-3652-894F-65DC-983ADA7110E9}"/>
+              </a:ext>
+            </a:extLst>
+          </p:cNvPr>
+          <p:cNvSpPr/>
+          <p:nvPr/>
+        </p:nvSpPr>
+        <p:spPr>
+          <a:xfrm>
+            <a:off x="702013" y="2296637"/>
+            <a:ext cx="10787974" cy="643366"/>
+          </a:xfrm>
+          <a:prstGeom prst="roundRect">
+            <a:avLst/>
+          </a:prstGeom>
+          <a:solidFill>
+            <a:schemeClr val="tx1">
+              <a:lumMod val="75000"/>
+              <a:lumOff val="25000"/>
+            </a:schemeClr>
+          </a:solidFill>
+          <a:ln>
+            <a:solidFill>
+              <a:srgbClr val="FFFF00"/>
+            </a:solidFill>
+          </a:ln>
+        </p:spPr>
+        <p:style>
+          <a:lnRef idx="2">
+            <a:schemeClr val="accent1">
+              <a:shade val="15000"/>
+            </a:schemeClr>
+          </a:lnRef>
+          <a:fillRef idx="1">
+            <a:schemeClr val="accent1"/>
+          </a:fillRef>
+          <a:effectRef idx="0">
+            <a:schemeClr val="accent1"/>
+          </a:effectRef>
+          <a:fontRef idx="minor">
+            <a:schemeClr val="lt1"/>
+          </a:fontRef>
+        </p:style>
+        <p:txBody>
+          <a:bodyPr rtlCol="0" anchor="ctr"/>
+          <a:lstStyle/>
+          <a:p>
+            <a:pPr algn="ctr"/>
+            <a:r>
+              <a:rPr lang="pt-BR" sz="2400" dirty="0">
+                <a:hlinkClick r:id="rId3"/>
+              </a:rPr>
+              <a:t>Grid do </a:t>
+            </a:r>
+            <a:r>
+              <a:rPr lang="pt-BR" sz="2400" dirty="0" err="1">
+                <a:hlinkClick r:id="rId3"/>
+              </a:rPr>
+              <a:t>Bootstrap</a:t>
+            </a:r>
+            <a:r>
+              <a:rPr lang="pt-BR" sz="2400" dirty="0">
+                <a:hlinkClick r:id="rId3"/>
+              </a:rPr>
+              <a:t> - Tutorial de Como Criar Layouts Responsivos - YouTube</a:t>
+            </a:r>
+            <a:endParaRPr lang="pt-BR" sz="2400" dirty="0"/>
+          </a:p>
+        </p:txBody>
+      </p:sp>
+      <p:pic>
+        <p:nvPicPr>
+          <p:cNvPr id="2" name="Picture 1">
+            <a:extLst>
+              <a:ext uri="{FF2B5EF4-FFF2-40B4-BE49-F238E27FC236}">
+                <a16:creationId xmlns:a16="http://schemas.microsoft.com/office/drawing/2014/main" id="{AE38484F-EC56-3A1E-6C59-E8B0943D69C8}"/>
+              </a:ext>
+            </a:extLst>
+          </p:cNvPr>
+          <p:cNvPicPr>
+            <a:picLocks noChangeAspect="1"/>
+          </p:cNvPicPr>
+          <p:nvPr/>
+        </p:nvPicPr>
+        <p:blipFill>
+          <a:blip r:embed="rId4"/>
+          <a:stretch>
+            <a:fillRect/>
+          </a:stretch>
+        </p:blipFill>
+        <p:spPr>
+          <a:xfrm>
+            <a:off x="2817995" y="3277466"/>
+            <a:ext cx="6101188" cy="3157296"/>
+          </a:xfrm>
+          <a:prstGeom prst="rect">
+            <a:avLst/>
+          </a:prstGeom>
+        </p:spPr>
+      </p:pic>
+    </p:spTree>
+    <p:extLst>
+      <p:ext uri="{BB962C8B-B14F-4D97-AF65-F5344CB8AC3E}">
+        <p14:creationId xmlns:p14="http://schemas.microsoft.com/office/powerpoint/2010/main" val="1961602161"/>
+      </p:ext>
+    </p:extLst>
+  </p:cSld>
+  <p:clrMapOvr>
+    <a:masterClrMapping/>
+  </p:clrMapOvr>
+  <mc:AlternateContent xmlns:mc="http://schemas.openxmlformats.org/markup-compatibility/2006" xmlns:p159="http://schemas.microsoft.com/office/powerpoint/2015/09/main">
+    <mc:Choice Requires="p159">
+      <p:transition xmlns:p14="http://schemas.microsoft.com/office/powerpoint/2010/main" spd="slow" p14:dur="2000">
+        <p159:morph option="byObject"/>
+      </p:transition>
+    </mc:Choice>
+    <mc:Fallback xmlns="">
+      <p:transition spd="slow">
+        <p:fade/>
+      </p:transition>
+    </mc:Fallback>
+  </mc:AlternateContent>
+</p:sld>
+</file>
+
+<file path=ppt/slides/slide13.xml><?xml version="1.0" encoding="utf-8"?>
+<p:sld xmlns:a="http://schemas.openxmlformats.org/drawingml/2006/main" xmlns:r="http://schemas.openxmlformats.org/officeDocument/2006/relationships" xmlns:p="http://schemas.openxmlformats.org/presentationml/2006/main">
+  <p:cSld>
+    <p:bg>
+      <p:bgPr>
+        <a:gradFill flip="none" rotWithShape="1">
+          <a:gsLst>
+            <a:gs pos="0">
+              <a:schemeClr val="accent5">
+                <a:lumMod val="5000"/>
+                <a:lumOff val="95000"/>
+              </a:schemeClr>
+            </a:gs>
+            <a:gs pos="100000">
+              <a:schemeClr val="tx1"/>
+            </a:gs>
+          </a:gsLst>
+          <a:lin ang="5400000" scaled="0"/>
+          <a:tileRect/>
+        </a:gradFill>
+        <a:effectLst/>
+      </p:bgPr>
+    </p:bg>
+    <p:spTree>
+      <p:nvGrpSpPr>
+        <p:cNvPr id="1" name="">
+          <a:extLst>
+            <a:ext uri="{FF2B5EF4-FFF2-40B4-BE49-F238E27FC236}">
               <a16:creationId xmlns:a16="http://schemas.microsoft.com/office/drawing/2014/main" id="{975081EF-9C2E-2A28-961F-9F6047E5FA2A}"/>
             </a:ext>
           </a:extLst>
@@ -5537,7 +6751,7 @@
         <p:cNvPr id="1" name="">
           <a:extLst>
             <a:ext uri="{FF2B5EF4-FFF2-40B4-BE49-F238E27FC236}">
-              <a16:creationId xmlns:a16="http://schemas.microsoft.com/office/drawing/2014/main" id="{D3FB5A75-37D8-F93D-8C12-2093DB52B673}"/>
+              <a16:creationId xmlns:a16="http://schemas.microsoft.com/office/drawing/2014/main" id="{6AE4872B-B89C-A2E5-3FD6-E61E1134C38F}"/>
             </a:ext>
           </a:extLst>
         </p:cNvPr>
@@ -5552,12 +6766,47 @@
           <a:chExt cx="0" cy="0"/>
         </a:xfrm>
       </p:grpSpPr>
-      <p:sp>
-        <p:nvSpPr>
-          <p:cNvPr id="4" name="Rectangle: Rounded Corners 3">
-            <a:extLst>
-              <a:ext uri="{FF2B5EF4-FFF2-40B4-BE49-F238E27FC236}">
-                <a16:creationId xmlns:a16="http://schemas.microsoft.com/office/drawing/2014/main" id="{9BE62E20-97B1-BF51-67EA-683A2010A894}"/>
+      <p:pic>
+        <p:nvPicPr>
+          <p:cNvPr id="5" name="Picture 4" descr="A blue and orange logo">
+            <a:extLst>
+              <a:ext uri="{FF2B5EF4-FFF2-40B4-BE49-F238E27FC236}">
+                <a16:creationId xmlns:a16="http://schemas.microsoft.com/office/drawing/2014/main" id="{F0BC4B5D-3247-AB78-AAB8-1D191A82868C}"/>
+              </a:ext>
+            </a:extLst>
+          </p:cNvPr>
+          <p:cNvPicPr>
+            <a:picLocks noChangeAspect="1"/>
+          </p:cNvPicPr>
+          <p:nvPr/>
+        </p:nvPicPr>
+        <p:blipFill>
+          <a:blip r:embed="rId2">
+            <a:extLst>
+              <a:ext uri="{28A0092B-C50C-407E-A947-70E740481C1C}">
+                <a14:useLocalDpi xmlns:a14="http://schemas.microsoft.com/office/drawing/2010/main" val="0"/>
+              </a:ext>
+            </a:extLst>
+          </a:blip>
+          <a:srcRect r="40990"/>
+          <a:stretch/>
+        </p:blipFill>
+        <p:spPr>
+          <a:xfrm>
+            <a:off x="10752304" y="12502"/>
+            <a:ext cx="1429966" cy="986828"/>
+          </a:xfrm>
+          <a:prstGeom prst="rect">
+            <a:avLst/>
+          </a:prstGeom>
+        </p:spPr>
+      </p:pic>
+      <p:sp>
+        <p:nvSpPr>
+          <p:cNvPr id="6" name="Rectangle: Rounded Corners 5">
+            <a:extLst>
+              <a:ext uri="{FF2B5EF4-FFF2-40B4-BE49-F238E27FC236}">
+                <a16:creationId xmlns:a16="http://schemas.microsoft.com/office/drawing/2014/main" id="{759200D8-434E-0201-4876-B10277CF17B6}"/>
               </a:ext>
             </a:extLst>
           </p:cNvPr>
@@ -5566,12 +6815,12 @@
         </p:nvSpPr>
         <p:spPr>
           <a:xfrm>
-            <a:off x="503889" y="2572966"/>
-            <a:ext cx="3946190" cy="2213042"/>
+            <a:off x="9345901" y="1177048"/>
+            <a:ext cx="2650246" cy="1088632"/>
           </a:xfrm>
           <a:prstGeom prst="roundRect">
             <a:avLst>
-              <a:gd name="adj" fmla="val 5133"/>
+              <a:gd name="adj" fmla="val 8371"/>
             </a:avLst>
           </a:prstGeom>
           <a:solidFill>
@@ -5603,66 +6852,26 @@
           </a:fontRef>
         </p:style>
         <p:txBody>
-          <a:bodyPr rtlCol="0" anchor="t"/>
-          <a:lstStyle/>
-          <a:p>
-            <a:pPr marL="342900" indent="-342900">
-              <a:buFont typeface="Arial" panose="020B0604020202020204" pitchFamily="34" charset="0"/>
-              <a:buChar char="•"/>
-            </a:pPr>
+          <a:bodyPr rtlCol="0" anchor="ctr"/>
+          <a:lstStyle/>
+          <a:p>
+            <a:r>
+              <a:rPr lang="pt-BR" sz="2400" dirty="0" err="1"/>
+              <a:t>Bootstrap</a:t>
+            </a:r>
             <a:r>
               <a:rPr lang="pt-BR" sz="2400" dirty="0"/>
-              <a:t>Economia de tempo</a:t>
-            </a:r>
-          </a:p>
-          <a:p>
-            <a:pPr marL="342900" indent="-342900">
-              <a:buFont typeface="Arial" panose="020B0604020202020204" pitchFamily="34" charset="0"/>
-              <a:buChar char="•"/>
-            </a:pPr>
-            <a:r>
-              <a:rPr lang="pt-BR" sz="2400" dirty="0"/>
-              <a:t>Consistência</a:t>
-            </a:r>
-          </a:p>
-          <a:p>
-            <a:pPr marL="342900" indent="-342900">
-              <a:buFont typeface="Arial" panose="020B0604020202020204" pitchFamily="34" charset="0"/>
-              <a:buChar char="•"/>
-            </a:pPr>
-            <a:r>
-              <a:rPr lang="pt-BR" sz="2400" dirty="0"/>
-              <a:t>Trabalho em equipe</a:t>
-            </a:r>
-          </a:p>
-          <a:p>
-            <a:pPr marL="342900" indent="-342900">
-              <a:buFont typeface="Arial" panose="020B0604020202020204" pitchFamily="34" charset="0"/>
-              <a:buChar char="•"/>
-            </a:pPr>
-            <a:r>
-              <a:rPr lang="pt-BR" sz="2400" dirty="0"/>
-              <a:t>Sistema de grid</a:t>
-            </a:r>
-          </a:p>
-          <a:p>
-            <a:pPr marL="342900" indent="-342900">
-              <a:buFont typeface="Arial" panose="020B0604020202020204" pitchFamily="34" charset="0"/>
-              <a:buChar char="•"/>
-            </a:pPr>
-            <a:r>
-              <a:rPr lang="pt-BR" sz="2400" dirty="0"/>
-              <a:t>Aplicações responsivas</a:t>
+              <a:t> – como podemos utilizar?</a:t>
             </a:r>
           </a:p>
         </p:txBody>
       </p:sp>
       <p:pic>
         <p:nvPicPr>
-          <p:cNvPr id="5" name="Picture 4" descr="A blue and orange logo">
-            <a:extLst>
-              <a:ext uri="{FF2B5EF4-FFF2-40B4-BE49-F238E27FC236}">
-                <a16:creationId xmlns:a16="http://schemas.microsoft.com/office/drawing/2014/main" id="{FBFB69AF-BC31-BB13-15DF-9B648D841720}"/>
+          <p:cNvPr id="3" name="Picture 2">
+            <a:extLst>
+              <a:ext uri="{FF2B5EF4-FFF2-40B4-BE49-F238E27FC236}">
+                <a16:creationId xmlns:a16="http://schemas.microsoft.com/office/drawing/2014/main" id="{7666D6BF-3B78-3D2D-ABEF-ABF827B48867}"/>
               </a:ext>
             </a:extLst>
           </p:cNvPr>
@@ -5672,20 +6881,15 @@
           <p:nvPr/>
         </p:nvPicPr>
         <p:blipFill>
-          <a:blip r:embed="rId2">
-            <a:extLst>
-              <a:ext uri="{28A0092B-C50C-407E-A947-70E740481C1C}">
-                <a14:useLocalDpi xmlns:a14="http://schemas.microsoft.com/office/drawing/2010/main" val="0"/>
-              </a:ext>
-            </a:extLst>
-          </a:blip>
-          <a:srcRect r="40990"/>
-          <a:stretch/>
+          <a:blip r:embed="rId3"/>
+          <a:stretch>
+            <a:fillRect/>
+          </a:stretch>
         </p:blipFill>
         <p:spPr>
           <a:xfrm>
-            <a:off x="10752304" y="12502"/>
-            <a:ext cx="1429966" cy="986828"/>
+            <a:off x="0" y="0"/>
+            <a:ext cx="8963583" cy="6858000"/>
           </a:xfrm>
           <a:prstGeom prst="rect">
             <a:avLst/>
@@ -5694,10 +6898,10 @@
       </p:pic>
       <p:sp>
         <p:nvSpPr>
-          <p:cNvPr id="6" name="Rectangle: Rounded Corners 5">
-            <a:extLst>
-              <a:ext uri="{FF2B5EF4-FFF2-40B4-BE49-F238E27FC236}">
-                <a16:creationId xmlns:a16="http://schemas.microsoft.com/office/drawing/2014/main" id="{38902722-D02B-476F-4D81-2E63BA6F4F7C}"/>
+          <p:cNvPr id="7" name="Rectangle: Rounded Corners 6">
+            <a:extLst>
+              <a:ext uri="{FF2B5EF4-FFF2-40B4-BE49-F238E27FC236}">
+                <a16:creationId xmlns:a16="http://schemas.microsoft.com/office/drawing/2014/main" id="{C0BA8874-DF09-A1DF-C835-5CBEBD04C43F}"/>
               </a:ext>
             </a:extLst>
           </p:cNvPr>
@@ -5706,11 +6910,13 @@
         </p:nvSpPr>
         <p:spPr>
           <a:xfrm>
-            <a:off x="421529" y="262648"/>
-            <a:ext cx="5674471" cy="865762"/>
+            <a:off x="9345901" y="2731528"/>
+            <a:ext cx="2650246" cy="1088632"/>
           </a:xfrm>
           <a:prstGeom prst="roundRect">
-            <a:avLst/>
+            <a:avLst>
+              <a:gd name="adj" fmla="val 8371"/>
+            </a:avLst>
           </a:prstGeom>
           <a:solidFill>
             <a:schemeClr val="tx1">
@@ -5745,22 +6951,18 @@
           <a:lstStyle/>
           <a:p>
             <a:r>
-              <a:rPr lang="pt-BR" sz="3600" dirty="0" err="1"/>
-              <a:t>Bootstrap</a:t>
-            </a:r>
-            <a:r>
-              <a:rPr lang="pt-BR" sz="3600" dirty="0"/>
-              <a:t> – Prós e Contras</a:t>
-            </a:r>
-          </a:p>
-        </p:txBody>
-      </p:sp>
-      <p:sp>
-        <p:nvSpPr>
-          <p:cNvPr id="2" name="Rectangle: Rounded Corners 1">
-            <a:extLst>
-              <a:ext uri="{FF2B5EF4-FFF2-40B4-BE49-F238E27FC236}">
-                <a16:creationId xmlns:a16="http://schemas.microsoft.com/office/drawing/2014/main" id="{6F6A9A4D-1477-540E-42AF-97F175892561}"/>
+              <a:rPr lang="pt-BR" sz="2400" dirty="0"/>
+              <a:t>Link do CSS</a:t>
+            </a:r>
+          </a:p>
+        </p:txBody>
+      </p:sp>
+      <p:sp>
+        <p:nvSpPr>
+          <p:cNvPr id="8" name="Rectangle: Rounded Corners 7">
+            <a:extLst>
+              <a:ext uri="{FF2B5EF4-FFF2-40B4-BE49-F238E27FC236}">
+                <a16:creationId xmlns:a16="http://schemas.microsoft.com/office/drawing/2014/main" id="{2BA684A6-13CE-44D0-ABE8-55A972B91EEC}"/>
               </a:ext>
             </a:extLst>
           </p:cNvPr>
@@ -5769,18 +6971,13 @@
         </p:nvSpPr>
         <p:spPr>
           <a:xfrm>
-            <a:off x="1564204" y="1838527"/>
-            <a:ext cx="1669918" cy="530159"/>
+            <a:off x="700391" y="1721364"/>
+            <a:ext cx="6916366" cy="447904"/>
           </a:xfrm>
           <a:prstGeom prst="roundRect">
             <a:avLst/>
           </a:prstGeom>
-          <a:solidFill>
-            <a:schemeClr val="tx1">
-              <a:lumMod val="75000"/>
-              <a:lumOff val="25000"/>
-            </a:schemeClr>
-          </a:solidFill>
+          <a:noFill/>
           <a:ln>
             <a:solidFill>
               <a:srgbClr val="FFFF00"/>
@@ -5808,205 +7005,27 @@
           <a:lstStyle/>
           <a:p>
             <a:pPr algn="ctr"/>
-            <a:r>
-              <a:rPr lang="pt-BR" sz="3600" dirty="0"/>
-              <a:t>Prós</a:t>
-            </a:r>
-          </a:p>
-        </p:txBody>
-      </p:sp>
-      <p:sp>
-        <p:nvSpPr>
-          <p:cNvPr id="3" name="Rectangle: Rounded Corners 2">
-            <a:extLst>
-              <a:ext uri="{FF2B5EF4-FFF2-40B4-BE49-F238E27FC236}">
-                <a16:creationId xmlns:a16="http://schemas.microsoft.com/office/drawing/2014/main" id="{37836899-443E-04E6-E69D-D611834E0CCE}"/>
-              </a:ext>
-            </a:extLst>
-          </p:cNvPr>
-          <p:cNvSpPr/>
-          <p:nvPr/>
-        </p:nvSpPr>
-        <p:spPr>
-          <a:xfrm>
-            <a:off x="6746453" y="1809347"/>
-            <a:ext cx="3946190" cy="1395919"/>
-          </a:xfrm>
-          <a:prstGeom prst="roundRect">
-            <a:avLst>
-              <a:gd name="adj" fmla="val 5133"/>
-            </a:avLst>
-          </a:prstGeom>
-          <a:solidFill>
-            <a:schemeClr val="tx1">
-              <a:lumMod val="75000"/>
-              <a:lumOff val="25000"/>
-            </a:schemeClr>
-          </a:solidFill>
-          <a:ln>
-            <a:solidFill>
-              <a:srgbClr val="FFFF00"/>
-            </a:solidFill>
-          </a:ln>
-        </p:spPr>
-        <p:style>
-          <a:lnRef idx="2">
-            <a:schemeClr val="accent1">
-              <a:shade val="15000"/>
-            </a:schemeClr>
-          </a:lnRef>
-          <a:fillRef idx="1">
-            <a:schemeClr val="accent1"/>
-          </a:fillRef>
-          <a:effectRef idx="0">
-            <a:schemeClr val="accent1"/>
-          </a:effectRef>
-          <a:fontRef idx="minor">
-            <a:schemeClr val="lt1"/>
-          </a:fontRef>
-        </p:style>
-        <p:txBody>
-          <a:bodyPr rtlCol="0" anchor="t"/>
-          <a:lstStyle/>
-          <a:p>
-            <a:pPr marL="342900" indent="-342900">
-              <a:buFont typeface="Arial" panose="020B0604020202020204" pitchFamily="34" charset="0"/>
-              <a:buChar char="•"/>
-            </a:pPr>
-            <a:r>
-              <a:rPr lang="pt-BR" sz="2400" dirty="0"/>
-              <a:t>Semelhante a outros</a:t>
-            </a:r>
-          </a:p>
-          <a:p>
-            <a:pPr marL="342900" indent="-342900">
-              <a:buFont typeface="Arial" panose="020B0604020202020204" pitchFamily="34" charset="0"/>
-              <a:buChar char="•"/>
-            </a:pPr>
-            <a:r>
-              <a:rPr lang="pt-BR" sz="2400" dirty="0"/>
-              <a:t>Curva de aprendizado</a:t>
-            </a:r>
-          </a:p>
-          <a:p>
-            <a:pPr marL="342900" indent="-342900">
-              <a:buFont typeface="Arial" panose="020B0604020202020204" pitchFamily="34" charset="0"/>
-              <a:buChar char="•"/>
-            </a:pPr>
-            <a:r>
-              <a:rPr lang="pt-BR" sz="2400" dirty="0"/>
-              <a:t>Tempo de carregamento</a:t>
-            </a:r>
-          </a:p>
-        </p:txBody>
-      </p:sp>
-      <p:sp>
-        <p:nvSpPr>
-          <p:cNvPr id="7" name="Rectangle: Rounded Corners 6">
-            <a:extLst>
-              <a:ext uri="{FF2B5EF4-FFF2-40B4-BE49-F238E27FC236}">
-                <a16:creationId xmlns:a16="http://schemas.microsoft.com/office/drawing/2014/main" id="{6DA6B46E-516F-6F6E-C204-A820FEB63C85}"/>
-              </a:ext>
-            </a:extLst>
-          </p:cNvPr>
-          <p:cNvSpPr/>
-          <p:nvPr/>
-        </p:nvSpPr>
-        <p:spPr>
-          <a:xfrm>
-            <a:off x="7538933" y="1074908"/>
-            <a:ext cx="2458508" cy="530159"/>
-          </a:xfrm>
-          <a:prstGeom prst="roundRect">
-            <a:avLst/>
-          </a:prstGeom>
-          <a:solidFill>
-            <a:schemeClr val="tx1">
-              <a:lumMod val="75000"/>
-              <a:lumOff val="25000"/>
-            </a:schemeClr>
-          </a:solidFill>
-          <a:ln>
-            <a:solidFill>
-              <a:srgbClr val="FFFF00"/>
-            </a:solidFill>
-          </a:ln>
-        </p:spPr>
-        <p:style>
-          <a:lnRef idx="2">
-            <a:schemeClr val="accent1">
-              <a:shade val="15000"/>
-            </a:schemeClr>
-          </a:lnRef>
-          <a:fillRef idx="1">
-            <a:schemeClr val="accent1"/>
-          </a:fillRef>
-          <a:effectRef idx="0">
-            <a:schemeClr val="accent1"/>
-          </a:effectRef>
-          <a:fontRef idx="minor">
-            <a:schemeClr val="lt1"/>
-          </a:fontRef>
-        </p:style>
-        <p:txBody>
-          <a:bodyPr rtlCol="0" anchor="ctr"/>
-          <a:lstStyle/>
-          <a:p>
-            <a:pPr algn="ctr"/>
-            <a:r>
-              <a:rPr lang="pt-BR" sz="3600" dirty="0"/>
-              <a:t>Contras</a:t>
-            </a:r>
-          </a:p>
-        </p:txBody>
-      </p:sp>
-      <p:pic>
-        <p:nvPicPr>
-          <p:cNvPr id="9" name="Picture 8">
-            <a:extLst>
-              <a:ext uri="{FF2B5EF4-FFF2-40B4-BE49-F238E27FC236}">
-                <a16:creationId xmlns:a16="http://schemas.microsoft.com/office/drawing/2014/main" id="{C1679A7E-1551-6641-F523-16158C760B89}"/>
-              </a:ext>
-            </a:extLst>
-          </p:cNvPr>
-          <p:cNvPicPr>
-            <a:picLocks noChangeAspect="1"/>
-          </p:cNvPicPr>
-          <p:nvPr/>
-        </p:nvPicPr>
-        <p:blipFill>
-          <a:blip r:embed="rId3"/>
-          <a:stretch>
-            <a:fillRect/>
-          </a:stretch>
-        </p:blipFill>
-        <p:spPr>
-          <a:xfrm>
-            <a:off x="4717915" y="3409546"/>
-            <a:ext cx="6101188" cy="3157296"/>
-          </a:xfrm>
-          <a:prstGeom prst="rect">
-            <a:avLst/>
-          </a:prstGeom>
-        </p:spPr>
-      </p:pic>
+            <a:endParaRPr lang="pt-BR"/>
+          </a:p>
+        </p:txBody>
+      </p:sp>
     </p:spTree>
     <p:extLst>
       <p:ext uri="{BB962C8B-B14F-4D97-AF65-F5344CB8AC3E}">
-        <p14:creationId xmlns:p14="http://schemas.microsoft.com/office/powerpoint/2010/main" val="4003374904"/>
+        <p14:creationId xmlns:p14="http://schemas.microsoft.com/office/powerpoint/2010/main" val="2175215992"/>
       </p:ext>
     </p:extLst>
   </p:cSld>
   <p:clrMapOvr>
     <a:masterClrMapping/>
   </p:clrMapOvr>
-  <mc:AlternateContent xmlns:mc="http://schemas.openxmlformats.org/markup-compatibility/2006" xmlns:p159="http://schemas.microsoft.com/office/powerpoint/2015/09/main">
-    <mc:Choice Requires="p159">
+  <mc:AlternateContent xmlns:mc="http://schemas.openxmlformats.org/markup-compatibility/2006">
+    <mc:Choice xmlns:p159="http://schemas.microsoft.com/office/powerpoint/2015/09/main" Requires="p159">
       <p:transition xmlns:p14="http://schemas.microsoft.com/office/powerpoint/2010/main" spd="slow" p14:dur="2000">
         <p159:morph option="byObject"/>
       </p:transition>
     </mc:Choice>
-    <mc:Fallback xmlns="">
+    <mc:Fallback>
       <p:transition spd="slow">
         <p:fade/>
       </p:transition>
@@ -6043,7 +7062,7 @@
         <p:cNvPr id="1" name="">
           <a:extLst>
             <a:ext uri="{FF2B5EF4-FFF2-40B4-BE49-F238E27FC236}">
-              <a16:creationId xmlns:a16="http://schemas.microsoft.com/office/drawing/2014/main" id="{A620F44C-2DEF-A051-E8B6-D3D2B47D6812}"/>
+              <a16:creationId xmlns:a16="http://schemas.microsoft.com/office/drawing/2014/main" id="{648C204E-8431-6255-603D-3E7A19D144FE}"/>
             </a:ext>
           </a:extLst>
         </p:cNvPr>
@@ -6060,10 +7079,10 @@
       </p:grpSpPr>
       <p:pic>
         <p:nvPicPr>
-          <p:cNvPr id="5" name="Picture 4" descr="A blue and orange logo">
-            <a:extLst>
-              <a:ext uri="{FF2B5EF4-FFF2-40B4-BE49-F238E27FC236}">
-                <a16:creationId xmlns:a16="http://schemas.microsoft.com/office/drawing/2014/main" id="{63516F30-74F7-466A-AF64-5C9607A85E3A}"/>
+          <p:cNvPr id="4" name="Picture 3">
+            <a:extLst>
+              <a:ext uri="{FF2B5EF4-FFF2-40B4-BE49-F238E27FC236}">
+                <a16:creationId xmlns:a16="http://schemas.microsoft.com/office/drawing/2014/main" id="{8FF004E1-367E-BB7A-75DE-585536DDB238}"/>
               </a:ext>
             </a:extLst>
           </p:cNvPr>
@@ -6073,7 +7092,36 @@
           <p:nvPr/>
         </p:nvPicPr>
         <p:blipFill>
-          <a:blip r:embed="rId2">
+          <a:blip r:embed="rId2"/>
+          <a:srcRect l="4219" r="7894"/>
+          <a:stretch/>
+        </p:blipFill>
+        <p:spPr>
+          <a:xfrm>
+            <a:off x="9722" y="0"/>
+            <a:ext cx="8917884" cy="6858000"/>
+          </a:xfrm>
+          <a:prstGeom prst="rect">
+            <a:avLst/>
+          </a:prstGeom>
+        </p:spPr>
+      </p:pic>
+      <p:pic>
+        <p:nvPicPr>
+          <p:cNvPr id="5" name="Picture 4" descr="A blue and orange logo">
+            <a:extLst>
+              <a:ext uri="{FF2B5EF4-FFF2-40B4-BE49-F238E27FC236}">
+                <a16:creationId xmlns:a16="http://schemas.microsoft.com/office/drawing/2014/main" id="{2A11B0DB-2719-E40D-D7BD-3F856CEECA83}"/>
+              </a:ext>
+            </a:extLst>
+          </p:cNvPr>
+          <p:cNvPicPr>
+            <a:picLocks noChangeAspect="1"/>
+          </p:cNvPicPr>
+          <p:nvPr/>
+        </p:nvPicPr>
+        <p:blipFill>
+          <a:blip r:embed="rId3">
             <a:extLst>
               <a:ext uri="{28A0092B-C50C-407E-A947-70E740481C1C}">
                 <a14:useLocalDpi xmlns:a14="http://schemas.microsoft.com/office/drawing/2010/main" val="0"/>
@@ -6098,7 +7146,7 @@
           <p:cNvPr id="6" name="Rectangle: Rounded Corners 5">
             <a:extLst>
               <a:ext uri="{FF2B5EF4-FFF2-40B4-BE49-F238E27FC236}">
-                <a16:creationId xmlns:a16="http://schemas.microsoft.com/office/drawing/2014/main" id="{E41CF007-B2E2-DE4B-6DB8-5DF9C5D41EE4}"/>
+                <a16:creationId xmlns:a16="http://schemas.microsoft.com/office/drawing/2014/main" id="{26A8B593-DE4E-7779-0F39-ED321BE1BFD5}"/>
               </a:ext>
             </a:extLst>
           </p:cNvPr>
@@ -6107,11 +7155,13 @@
         </p:nvSpPr>
         <p:spPr>
           <a:xfrm>
-            <a:off x="421529" y="262648"/>
-            <a:ext cx="2565511" cy="865762"/>
+            <a:off x="9345901" y="1177048"/>
+            <a:ext cx="2650246" cy="1088632"/>
           </a:xfrm>
           <a:prstGeom prst="roundRect">
-            <a:avLst/>
+            <a:avLst>
+              <a:gd name="adj" fmla="val 8371"/>
+            </a:avLst>
           </a:prstGeom>
           <a:solidFill>
             <a:schemeClr val="tx1">
@@ -6146,50 +7196,22 @@
           <a:lstStyle/>
           <a:p>
             <a:r>
-              <a:rPr lang="pt-BR" sz="3600" dirty="0" err="1"/>
+              <a:rPr lang="pt-BR" sz="2400" dirty="0" err="1"/>
               <a:t>Bootstrap</a:t>
             </a:r>
-            <a:endParaRPr lang="pt-BR" sz="3600" dirty="0"/>
-          </a:p>
-        </p:txBody>
-      </p:sp>
-      <p:pic>
-        <p:nvPicPr>
-          <p:cNvPr id="3" name="Picture 2">
-            <a:hlinkClick r:id="rId3"/>
-            <a:extLst>
-              <a:ext uri="{FF2B5EF4-FFF2-40B4-BE49-F238E27FC236}">
-                <a16:creationId xmlns:a16="http://schemas.microsoft.com/office/drawing/2014/main" id="{58652111-22C2-E03D-1E99-E69A99F46F2C}"/>
-              </a:ext>
-            </a:extLst>
-          </p:cNvPr>
-          <p:cNvPicPr>
-            <a:picLocks noChangeAspect="1"/>
-          </p:cNvPicPr>
-          <p:nvPr/>
-        </p:nvPicPr>
-        <p:blipFill>
-          <a:blip r:embed="rId4"/>
-          <a:stretch>
-            <a:fillRect/>
-          </a:stretch>
-        </p:blipFill>
-        <p:spPr>
-          <a:xfrm>
-            <a:off x="1882303" y="1338895"/>
-            <a:ext cx="8427393" cy="4531753"/>
-          </a:xfrm>
-          <a:prstGeom prst="rect">
-            <a:avLst/>
-          </a:prstGeom>
-        </p:spPr>
-      </p:pic>
+            <a:r>
+              <a:rPr lang="pt-BR" sz="2400" dirty="0"/>
+              <a:t> – como podemos utilizar?</a:t>
+            </a:r>
+          </a:p>
+        </p:txBody>
+      </p:sp>
       <p:sp>
         <p:nvSpPr>
           <p:cNvPr id="7" name="Rectangle: Rounded Corners 6">
             <a:extLst>
               <a:ext uri="{FF2B5EF4-FFF2-40B4-BE49-F238E27FC236}">
-                <a16:creationId xmlns:a16="http://schemas.microsoft.com/office/drawing/2014/main" id="{EF94303F-B490-93BB-34E8-B613B9EA9FC8}"/>
+                <a16:creationId xmlns:a16="http://schemas.microsoft.com/office/drawing/2014/main" id="{FBB72CA1-1943-3488-8B67-AB973FC7BD42}"/>
               </a:ext>
             </a:extLst>
           </p:cNvPr>
@@ -6198,11 +7220,13 @@
         </p:nvSpPr>
         <p:spPr>
           <a:xfrm>
-            <a:off x="4075890" y="341378"/>
-            <a:ext cx="6063570" cy="643366"/>
+            <a:off x="9345901" y="2731528"/>
+            <a:ext cx="2650246" cy="1088632"/>
           </a:xfrm>
           <a:prstGeom prst="roundRect">
-            <a:avLst/>
+            <a:avLst>
+              <a:gd name="adj" fmla="val 8371"/>
+            </a:avLst>
           </a:prstGeom>
           <a:solidFill>
             <a:schemeClr val="tx1">
@@ -6236,34 +7260,82 @@
           <a:bodyPr rtlCol="0" anchor="ctr"/>
           <a:lstStyle/>
           <a:p>
+            <a:r>
+              <a:rPr lang="pt-BR" sz="2400" dirty="0"/>
+              <a:t>Link do script</a:t>
+            </a:r>
+          </a:p>
+        </p:txBody>
+      </p:sp>
+      <p:sp>
+        <p:nvSpPr>
+          <p:cNvPr id="8" name="Rectangle: Rounded Corners 7">
+            <a:extLst>
+              <a:ext uri="{FF2B5EF4-FFF2-40B4-BE49-F238E27FC236}">
+                <a16:creationId xmlns:a16="http://schemas.microsoft.com/office/drawing/2014/main" id="{A4D7D513-852A-77A8-8B69-E2A98D5ACB2C}"/>
+              </a:ext>
+            </a:extLst>
+          </p:cNvPr>
+          <p:cNvSpPr/>
+          <p:nvPr/>
+        </p:nvSpPr>
+        <p:spPr>
+          <a:xfrm>
+            <a:off x="749030" y="3647440"/>
+            <a:ext cx="8268510" cy="447904"/>
+          </a:xfrm>
+          <a:prstGeom prst="roundRect">
+            <a:avLst/>
+          </a:prstGeom>
+          <a:noFill/>
+          <a:ln>
+            <a:solidFill>
+              <a:srgbClr val="FFFF00"/>
+            </a:solidFill>
+          </a:ln>
+        </p:spPr>
+        <p:style>
+          <a:lnRef idx="2">
+            <a:schemeClr val="accent1">
+              <a:shade val="15000"/>
+            </a:schemeClr>
+          </a:lnRef>
+          <a:fillRef idx="1">
+            <a:schemeClr val="accent1"/>
+          </a:fillRef>
+          <a:effectRef idx="0">
+            <a:schemeClr val="accent1"/>
+          </a:effectRef>
+          <a:fontRef idx="minor">
+            <a:schemeClr val="lt1"/>
+          </a:fontRef>
+        </p:style>
+        <p:txBody>
+          <a:bodyPr rtlCol="0" anchor="ctr"/>
+          <a:lstStyle/>
+          <a:p>
             <a:pPr algn="ctr"/>
-            <a:r>
-              <a:rPr lang="en-US" sz="2400" dirty="0">
-                <a:hlinkClick r:id="rId5"/>
-              </a:rPr>
-              <a:t>Get started with Bootstrap · Bootstrap v5.3</a:t>
-            </a:r>
-            <a:endParaRPr lang="pt-BR" sz="2400" dirty="0"/>
+            <a:endParaRPr lang="pt-BR"/>
           </a:p>
         </p:txBody>
       </p:sp>
     </p:spTree>
     <p:extLst>
       <p:ext uri="{BB962C8B-B14F-4D97-AF65-F5344CB8AC3E}">
-        <p14:creationId xmlns:p14="http://schemas.microsoft.com/office/powerpoint/2010/main" val="441519137"/>
+        <p14:creationId xmlns:p14="http://schemas.microsoft.com/office/powerpoint/2010/main" val="846773731"/>
       </p:ext>
     </p:extLst>
   </p:cSld>
   <p:clrMapOvr>
     <a:masterClrMapping/>
   </p:clrMapOvr>
-  <mc:AlternateContent xmlns:mc="http://schemas.openxmlformats.org/markup-compatibility/2006" xmlns:p159="http://schemas.microsoft.com/office/powerpoint/2015/09/main">
-    <mc:Choice Requires="p159">
+  <mc:AlternateContent xmlns:mc="http://schemas.openxmlformats.org/markup-compatibility/2006">
+    <mc:Choice xmlns:p159="http://schemas.microsoft.com/office/powerpoint/2015/09/main" Requires="p159">
       <p:transition xmlns:p14="http://schemas.microsoft.com/office/powerpoint/2010/main" spd="slow" p14:dur="2000">
         <p159:morph option="byObject"/>
       </p:transition>
     </mc:Choice>
-    <mc:Fallback xmlns="">
+    <mc:Fallback>
       <p:transition spd="slow">
         <p:fade/>
       </p:transition>
@@ -6300,7 +7372,7 @@
         <p:cNvPr id="1" name="">
           <a:extLst>
             <a:ext uri="{FF2B5EF4-FFF2-40B4-BE49-F238E27FC236}">
-              <a16:creationId xmlns:a16="http://schemas.microsoft.com/office/drawing/2014/main" id="{206D9CAD-AB07-6A65-3777-44836CEFCD7A}"/>
+              <a16:creationId xmlns:a16="http://schemas.microsoft.com/office/drawing/2014/main" id="{61EEF0D4-C326-3D9C-B583-E93F1A1FD07E}"/>
             </a:ext>
           </a:extLst>
         </p:cNvPr>
@@ -6320,7 +7392,7 @@
           <p:cNvPr id="5" name="Picture 4" descr="A blue and orange logo">
             <a:extLst>
               <a:ext uri="{FF2B5EF4-FFF2-40B4-BE49-F238E27FC236}">
-                <a16:creationId xmlns:a16="http://schemas.microsoft.com/office/drawing/2014/main" id="{E5745440-D04C-BBC9-3B6B-48EE590BFF9C}"/>
+                <a16:creationId xmlns:a16="http://schemas.microsoft.com/office/drawing/2014/main" id="{FDB9FA26-B60C-CB9A-D66A-A4240CA039FF}"/>
               </a:ext>
             </a:extLst>
           </p:cNvPr>
@@ -6355,7 +7427,7 @@
           <p:cNvPr id="6" name="Rectangle: Rounded Corners 5">
             <a:extLst>
               <a:ext uri="{FF2B5EF4-FFF2-40B4-BE49-F238E27FC236}">
-                <a16:creationId xmlns:a16="http://schemas.microsoft.com/office/drawing/2014/main" id="{39C52DA1-CE5E-AD4D-43FC-519F0FC0BF02}"/>
+                <a16:creationId xmlns:a16="http://schemas.microsoft.com/office/drawing/2014/main" id="{F300768F-112E-4076-BD3C-311A0D14326C}"/>
               </a:ext>
             </a:extLst>
           </p:cNvPr>
@@ -6364,11 +7436,13 @@
         </p:nvSpPr>
         <p:spPr>
           <a:xfrm>
-            <a:off x="421529" y="262648"/>
-            <a:ext cx="2565511" cy="865762"/>
+            <a:off x="9345901" y="1177048"/>
+            <a:ext cx="2650246" cy="1088632"/>
           </a:xfrm>
           <a:prstGeom prst="roundRect">
-            <a:avLst/>
+            <a:avLst>
+              <a:gd name="adj" fmla="val 8371"/>
+            </a:avLst>
           </a:prstGeom>
           <a:solidFill>
             <a:schemeClr val="tx1">
@@ -6403,19 +7477,51 @@
           <a:lstStyle/>
           <a:p>
             <a:r>
-              <a:rPr lang="pt-BR" sz="3600" dirty="0" err="1"/>
+              <a:rPr lang="pt-BR" sz="2400" dirty="0" err="1"/>
               <a:t>Bootstrap</a:t>
             </a:r>
-            <a:endParaRPr lang="pt-BR" sz="3600" dirty="0"/>
-          </a:p>
-        </p:txBody>
-      </p:sp>
+            <a:r>
+              <a:rPr lang="pt-BR" sz="2400" dirty="0"/>
+              <a:t> – como podemos utilizar?</a:t>
+            </a:r>
+          </a:p>
+        </p:txBody>
+      </p:sp>
+      <p:pic>
+        <p:nvPicPr>
+          <p:cNvPr id="3" name="Picture 2">
+            <a:extLst>
+              <a:ext uri="{FF2B5EF4-FFF2-40B4-BE49-F238E27FC236}">
+                <a16:creationId xmlns:a16="http://schemas.microsoft.com/office/drawing/2014/main" id="{8BA0E29D-C4F6-6082-4962-EFCCBF7C0794}"/>
+              </a:ext>
+            </a:extLst>
+          </p:cNvPr>
+          <p:cNvPicPr>
+            <a:picLocks noChangeAspect="1"/>
+          </p:cNvPicPr>
+          <p:nvPr/>
+        </p:nvPicPr>
+        <p:blipFill>
+          <a:blip r:embed="rId3"/>
+          <a:srcRect l="2540" t="30071" r="24141"/>
+          <a:stretch/>
+        </p:blipFill>
+        <p:spPr>
+          <a:xfrm>
+            <a:off x="19451" y="-4"/>
+            <a:ext cx="8984768" cy="6556443"/>
+          </a:xfrm>
+          <a:prstGeom prst="rect">
+            <a:avLst/>
+          </a:prstGeom>
+        </p:spPr>
+      </p:pic>
       <p:sp>
         <p:nvSpPr>
           <p:cNvPr id="7" name="Rectangle: Rounded Corners 6">
             <a:extLst>
               <a:ext uri="{FF2B5EF4-FFF2-40B4-BE49-F238E27FC236}">
-                <a16:creationId xmlns:a16="http://schemas.microsoft.com/office/drawing/2014/main" id="{4A3CE760-3652-894F-65DC-983ADA7110E9}"/>
+                <a16:creationId xmlns:a16="http://schemas.microsoft.com/office/drawing/2014/main" id="{767042FB-6B94-2AA4-34CB-103CFC54EA10}"/>
               </a:ext>
             </a:extLst>
           </p:cNvPr>
@@ -6424,11 +7530,13 @@
         </p:nvSpPr>
         <p:spPr>
           <a:xfrm>
-            <a:off x="702013" y="2296637"/>
-            <a:ext cx="10787974" cy="643366"/>
+            <a:off x="9345901" y="2731528"/>
+            <a:ext cx="2650246" cy="1088632"/>
           </a:xfrm>
           <a:prstGeom prst="roundRect">
-            <a:avLst/>
+            <a:avLst>
+              <a:gd name="adj" fmla="val 8371"/>
+            </a:avLst>
           </a:prstGeom>
           <a:solidFill>
             <a:schemeClr val="tx1">
@@ -6462,63 +7570,173 @@
           <a:bodyPr rtlCol="0" anchor="ctr"/>
           <a:lstStyle/>
           <a:p>
-            <a:pPr algn="ctr"/>
-            <a:r>
-              <a:rPr lang="pt-BR" sz="2400" dirty="0">
-                <a:hlinkClick r:id="rId3"/>
-              </a:rPr>
-              <a:t>Grid do </a:t>
-            </a:r>
-            <a:r>
-              <a:rPr lang="pt-BR" sz="2400" dirty="0" err="1">
-                <a:hlinkClick r:id="rId3"/>
-              </a:rPr>
-              <a:t>Bootstrap</a:t>
-            </a:r>
-            <a:r>
-              <a:rPr lang="pt-BR" sz="2400" dirty="0">
-                <a:hlinkClick r:id="rId3"/>
-              </a:rPr>
-              <a:t> - Tutorial de Como Criar Layouts Responsivos - YouTube</a:t>
-            </a:r>
-            <a:endParaRPr lang="pt-BR" sz="2400" dirty="0"/>
-          </a:p>
-        </p:txBody>
-      </p:sp>
-      <p:pic>
-        <p:nvPicPr>
-          <p:cNvPr id="2" name="Picture 1">
-            <a:extLst>
-              <a:ext uri="{FF2B5EF4-FFF2-40B4-BE49-F238E27FC236}">
-                <a16:creationId xmlns:a16="http://schemas.microsoft.com/office/drawing/2014/main" id="{AE38484F-EC56-3A1E-6C59-E8B0943D69C8}"/>
-              </a:ext>
-            </a:extLst>
-          </p:cNvPr>
-          <p:cNvPicPr>
-            <a:picLocks noChangeAspect="1"/>
-          </p:cNvPicPr>
+            <a:r>
+              <a:rPr lang="pt-BR" sz="2400" dirty="0"/>
+              <a:t>Adicionando classes</a:t>
+            </a:r>
+          </a:p>
+        </p:txBody>
+      </p:sp>
+      <p:sp>
+        <p:nvSpPr>
+          <p:cNvPr id="8" name="Rectangle: Rounded Corners 7">
+            <a:extLst>
+              <a:ext uri="{FF2B5EF4-FFF2-40B4-BE49-F238E27FC236}">
+                <a16:creationId xmlns:a16="http://schemas.microsoft.com/office/drawing/2014/main" id="{FBEECA16-8A84-AFB1-A872-D59B4A366F83}"/>
+              </a:ext>
+            </a:extLst>
+          </p:cNvPr>
+          <p:cNvSpPr/>
           <p:nvPr/>
-        </p:nvPicPr>
-        <p:blipFill>
-          <a:blip r:embed="rId4"/>
-          <a:stretch>
-            <a:fillRect/>
-          </a:stretch>
-        </p:blipFill>
-        <p:spPr>
-          <a:xfrm>
-            <a:off x="2817995" y="3277466"/>
-            <a:ext cx="6101188" cy="3157296"/>
-          </a:xfrm>
-          <a:prstGeom prst="rect">
+        </p:nvSpPr>
+        <p:spPr>
+          <a:xfrm>
+            <a:off x="437745" y="437819"/>
+            <a:ext cx="1789891" cy="214010"/>
+          </a:xfrm>
+          <a:prstGeom prst="roundRect">
             <a:avLst/>
           </a:prstGeom>
-        </p:spPr>
-      </p:pic>
+          <a:noFill/>
+          <a:ln>
+            <a:solidFill>
+              <a:srgbClr val="FFFF00"/>
+            </a:solidFill>
+          </a:ln>
+        </p:spPr>
+        <p:style>
+          <a:lnRef idx="2">
+            <a:schemeClr val="accent1">
+              <a:shade val="15000"/>
+            </a:schemeClr>
+          </a:lnRef>
+          <a:fillRef idx="1">
+            <a:schemeClr val="accent1"/>
+          </a:fillRef>
+          <a:effectRef idx="0">
+            <a:schemeClr val="accent1"/>
+          </a:effectRef>
+          <a:fontRef idx="minor">
+            <a:schemeClr val="lt1"/>
+          </a:fontRef>
+        </p:style>
+        <p:txBody>
+          <a:bodyPr rtlCol="0" anchor="ctr"/>
+          <a:lstStyle/>
+          <a:p>
+            <a:pPr algn="ctr"/>
+            <a:endParaRPr lang="pt-BR"/>
+          </a:p>
+        </p:txBody>
+      </p:sp>
+      <p:sp>
+        <p:nvSpPr>
+          <p:cNvPr id="2" name="Rectangle: Rounded Corners 1">
+            <a:extLst>
+              <a:ext uri="{FF2B5EF4-FFF2-40B4-BE49-F238E27FC236}">
+                <a16:creationId xmlns:a16="http://schemas.microsoft.com/office/drawing/2014/main" id="{689E553E-C42B-11C2-1E02-56A478E6FED3}"/>
+              </a:ext>
+            </a:extLst>
+          </p:cNvPr>
+          <p:cNvSpPr/>
+          <p:nvPr/>
+        </p:nvSpPr>
+        <p:spPr>
+          <a:xfrm>
+            <a:off x="1128411" y="1040856"/>
+            <a:ext cx="7179010" cy="214010"/>
+          </a:xfrm>
+          <a:prstGeom prst="roundRect">
+            <a:avLst/>
+          </a:prstGeom>
+          <a:noFill/>
+          <a:ln>
+            <a:solidFill>
+              <a:srgbClr val="FFFF00"/>
+            </a:solidFill>
+          </a:ln>
+        </p:spPr>
+        <p:style>
+          <a:lnRef idx="2">
+            <a:schemeClr val="accent1">
+              <a:shade val="15000"/>
+            </a:schemeClr>
+          </a:lnRef>
+          <a:fillRef idx="1">
+            <a:schemeClr val="accent1"/>
+          </a:fillRef>
+          <a:effectRef idx="0">
+            <a:schemeClr val="accent1"/>
+          </a:effectRef>
+          <a:fontRef idx="minor">
+            <a:schemeClr val="lt1"/>
+          </a:fontRef>
+        </p:style>
+        <p:txBody>
+          <a:bodyPr rtlCol="0" anchor="ctr"/>
+          <a:lstStyle/>
+          <a:p>
+            <a:pPr algn="ctr"/>
+            <a:endParaRPr lang="pt-BR"/>
+          </a:p>
+        </p:txBody>
+      </p:sp>
+      <p:sp>
+        <p:nvSpPr>
+          <p:cNvPr id="9" name="Rectangle: Rounded Corners 8">
+            <a:extLst>
+              <a:ext uri="{FF2B5EF4-FFF2-40B4-BE49-F238E27FC236}">
+                <a16:creationId xmlns:a16="http://schemas.microsoft.com/office/drawing/2014/main" id="{E7E8C3EB-4838-6681-DAE4-C07A77B3A9E6}"/>
+              </a:ext>
+            </a:extLst>
+          </p:cNvPr>
+          <p:cNvSpPr/>
+          <p:nvPr/>
+        </p:nvSpPr>
+        <p:spPr>
+          <a:xfrm>
+            <a:off x="2130361" y="4961102"/>
+            <a:ext cx="2266541" cy="214010"/>
+          </a:xfrm>
+          <a:prstGeom prst="roundRect">
+            <a:avLst/>
+          </a:prstGeom>
+          <a:noFill/>
+          <a:ln>
+            <a:solidFill>
+              <a:srgbClr val="FFFF00"/>
+            </a:solidFill>
+          </a:ln>
+        </p:spPr>
+        <p:style>
+          <a:lnRef idx="2">
+            <a:schemeClr val="accent1">
+              <a:shade val="15000"/>
+            </a:schemeClr>
+          </a:lnRef>
+          <a:fillRef idx="1">
+            <a:schemeClr val="accent1"/>
+          </a:fillRef>
+          <a:effectRef idx="0">
+            <a:schemeClr val="accent1"/>
+          </a:effectRef>
+          <a:fontRef idx="minor">
+            <a:schemeClr val="lt1"/>
+          </a:fontRef>
+        </p:style>
+        <p:txBody>
+          <a:bodyPr rtlCol="0" anchor="ctr"/>
+          <a:lstStyle/>
+          <a:p>
+            <a:pPr algn="ctr"/>
+            <a:endParaRPr lang="pt-BR"/>
+          </a:p>
+        </p:txBody>
+      </p:sp>
     </p:spTree>
     <p:extLst>
       <p:ext uri="{BB962C8B-B14F-4D97-AF65-F5344CB8AC3E}">
-        <p14:creationId xmlns:p14="http://schemas.microsoft.com/office/powerpoint/2010/main" val="1961602161"/>
+        <p14:creationId xmlns:p14="http://schemas.microsoft.com/office/powerpoint/2010/main" val="3091828657"/>
       </p:ext>
     </p:extLst>
   </p:cSld>

</xml_diff>